<commit_message>
address #142 to change node ref
</commit_message>
<xml_diff>
--- a/documentation/idioms/wrapper/diagram.pptx
+++ b/documentation/idioms/wrapper/diagram.pptx
@@ -104,6 +104,22 @@
       </a:defRPr>
     </a:lvl9pPr>
   </p:defaultTextStyle>
+  <p:extLst>
+    <p:ext uri="{EFAFB233-063F-42B5-8137-9DF3F51BA10A}">
+      <p15:sldGuideLst xmlns:p15="http://schemas.microsoft.com/office/powerpoint/2012/main">
+        <p15:guide id="1" orient="horz" pos="2160">
+          <p15:clr>
+            <a:srgbClr val="A4A3A4"/>
+          </p15:clr>
+        </p15:guide>
+        <p15:guide id="2" pos="2880">
+          <p15:clr>
+            <a:srgbClr val="A4A3A4"/>
+          </p15:clr>
+        </p15:guide>
+      </p15:sldGuideLst>
+    </p:ext>
+  </p:extLst>
 </p:presentation>
 </file>
 
@@ -288,7 +304,7 @@
           <a:p>
             <a:fld id="{13F24B86-36D2-4655-BE2F-98B661AC85E1}" type="datetimeFigureOut">
               <a:rPr lang="en-US" smtClean="0"/>
-              <a:t>3/31/2014</a:t>
+              <a:t>10/28/2014</a:t>
             </a:fld>
             <a:endParaRPr lang="en-US"/>
           </a:p>
@@ -458,7 +474,7 @@
           <a:p>
             <a:fld id="{13F24B86-36D2-4655-BE2F-98B661AC85E1}" type="datetimeFigureOut">
               <a:rPr lang="en-US" smtClean="0"/>
-              <a:t>3/31/2014</a:t>
+              <a:t>10/28/2014</a:t>
             </a:fld>
             <a:endParaRPr lang="en-US"/>
           </a:p>
@@ -638,7 +654,7 @@
           <a:p>
             <a:fld id="{13F24B86-36D2-4655-BE2F-98B661AC85E1}" type="datetimeFigureOut">
               <a:rPr lang="en-US" smtClean="0"/>
-              <a:t>3/31/2014</a:t>
+              <a:t>10/28/2014</a:t>
             </a:fld>
             <a:endParaRPr lang="en-US"/>
           </a:p>
@@ -808,7 +824,7 @@
           <a:p>
             <a:fld id="{13F24B86-36D2-4655-BE2F-98B661AC85E1}" type="datetimeFigureOut">
               <a:rPr lang="en-US" smtClean="0"/>
-              <a:t>3/31/2014</a:t>
+              <a:t>10/28/2014</a:t>
             </a:fld>
             <a:endParaRPr lang="en-US"/>
           </a:p>
@@ -1054,7 +1070,7 @@
           <a:p>
             <a:fld id="{13F24B86-36D2-4655-BE2F-98B661AC85E1}" type="datetimeFigureOut">
               <a:rPr lang="en-US" smtClean="0"/>
-              <a:t>3/31/2014</a:t>
+              <a:t>10/28/2014</a:t>
             </a:fld>
             <a:endParaRPr lang="en-US"/>
           </a:p>
@@ -1342,7 +1358,7 @@
           <a:p>
             <a:fld id="{13F24B86-36D2-4655-BE2F-98B661AC85E1}" type="datetimeFigureOut">
               <a:rPr lang="en-US" smtClean="0"/>
-              <a:t>3/31/2014</a:t>
+              <a:t>10/28/2014</a:t>
             </a:fld>
             <a:endParaRPr lang="en-US"/>
           </a:p>
@@ -1764,7 +1780,7 @@
           <a:p>
             <a:fld id="{13F24B86-36D2-4655-BE2F-98B661AC85E1}" type="datetimeFigureOut">
               <a:rPr lang="en-US" smtClean="0"/>
-              <a:t>3/31/2014</a:t>
+              <a:t>10/28/2014</a:t>
             </a:fld>
             <a:endParaRPr lang="en-US"/>
           </a:p>
@@ -1882,7 +1898,7 @@
           <a:p>
             <a:fld id="{13F24B86-36D2-4655-BE2F-98B661AC85E1}" type="datetimeFigureOut">
               <a:rPr lang="en-US" smtClean="0"/>
-              <a:t>3/31/2014</a:t>
+              <a:t>10/28/2014</a:t>
             </a:fld>
             <a:endParaRPr lang="en-US"/>
           </a:p>
@@ -1977,7 +1993,7 @@
           <a:p>
             <a:fld id="{13F24B86-36D2-4655-BE2F-98B661AC85E1}" type="datetimeFigureOut">
               <a:rPr lang="en-US" smtClean="0"/>
-              <a:t>3/31/2014</a:t>
+              <a:t>10/28/2014</a:t>
             </a:fld>
             <a:endParaRPr lang="en-US"/>
           </a:p>
@@ -2254,7 +2270,7 @@
           <a:p>
             <a:fld id="{13F24B86-36D2-4655-BE2F-98B661AC85E1}" type="datetimeFigureOut">
               <a:rPr lang="en-US" smtClean="0"/>
-              <a:t>3/31/2014</a:t>
+              <a:t>10/28/2014</a:t>
             </a:fld>
             <a:endParaRPr lang="en-US"/>
           </a:p>
@@ -2507,7 +2523,7 @@
           <a:p>
             <a:fld id="{13F24B86-36D2-4655-BE2F-98B661AC85E1}" type="datetimeFigureOut">
               <a:rPr lang="en-US" smtClean="0"/>
-              <a:t>3/31/2014</a:t>
+              <a:t>10/28/2014</a:t>
             </a:fld>
             <a:endParaRPr lang="en-US"/>
           </a:p>
@@ -2720,7 +2736,7 @@
           <a:p>
             <a:fld id="{13F24B86-36D2-4655-BE2F-98B661AC85E1}" type="datetimeFigureOut">
               <a:rPr lang="en-US" smtClean="0"/>
-              <a:t>3/31/2014</a:t>
+              <a:t>10/28/2014</a:t>
             </a:fld>
             <a:endParaRPr lang="en-US"/>
           </a:p>
@@ -3104,7 +3120,7 @@
           <p:nvPr>
             <p:extLst>
               <p:ext uri="{D42A27DB-BD31-4B8C-83A1-F6EECF244321}">
-                <p14:modId xmlns:p14="http://schemas.microsoft.com/office/powerpoint/2010/main" val="307297966"/>
+                <p14:modId xmlns:p14="http://schemas.microsoft.com/office/powerpoint/2010/main" val="1590912230"/>
               </p:ext>
             </p:extLst>
           </p:nvPr>
@@ -3563,11 +3579,7 @@
                     <a:p>
                       <a:r>
                         <a:rPr lang="en-US" sz="1100" b="0" dirty="0" smtClean="0"/>
-                        <a:t>    </a:t>
-                      </a:r>
-                      <a:r>
-                        <a:rPr lang="en-US" sz="1100" b="0" dirty="0" smtClean="0"/>
-                        <a:t>    Identity</a:t>
+                        <a:t>        Identity</a:t>
                       </a:r>
                       <a:endParaRPr lang="en-US" sz="1100" b="0" dirty="0"/>
                     </a:p>
@@ -3684,11 +3696,7 @@
                     <a:p>
                       <a:r>
                         <a:rPr lang="en-US" sz="1100" b="0" dirty="0" smtClean="0"/>
-                        <a:t>        </a:t>
-                      </a:r>
-                      <a:r>
-                        <a:rPr lang="en-US" sz="1100" b="0" dirty="0" smtClean="0"/>
-                        <a:t>    Name</a:t>
+                        <a:t>            Name</a:t>
                       </a:r>
                       <a:endParaRPr lang="en-US" sz="1100" b="0" dirty="0"/>
                     </a:p>
@@ -5096,8 +5104,16 @@
                             </a:schemeClr>
                           </a:solidFill>
                         </a:rPr>
-                        <a:t>../../../../node()</a:t>
+                        <a:t>../../../../descendant-or-self::node()</a:t>
                       </a:r>
+                      <a:endParaRPr lang="en-US" sz="1100" b="0" dirty="0" smtClean="0">
+                        <a:solidFill>
+                          <a:schemeClr val="tx1">
+                            <a:lumMod val="95000"/>
+                            <a:lumOff val="5000"/>
+                          </a:schemeClr>
+                        </a:solidFill>
+                      </a:endParaRPr>
                     </a:p>
                   </a:txBody>
                   <a:tcPr>
@@ -6682,8 +6698,16 @@
                             </a:schemeClr>
                           </a:solidFill>
                         </a:rPr>
-                        <a:t>../../../../node()</a:t>
+                        <a:t>../../../../descendant-or-self::node()</a:t>
                       </a:r>
+                      <a:endParaRPr lang="en-US" sz="1100" b="0" dirty="0" smtClean="0">
+                        <a:solidFill>
+                          <a:schemeClr val="tx1">
+                            <a:lumMod val="95000"/>
+                            <a:lumOff val="5000"/>
+                          </a:schemeClr>
+                        </a:solidFill>
+                      </a:endParaRPr>
                     </a:p>
                   </a:txBody>
                   <a:tcPr>

</xml_diff>

<commit_message>
Updated the wrapper idiom to talk about packages and reports, closes #239 and #240
</commit_message>
<xml_diff>
--- a/documentation/idioms/wrapper/diagram.pptx
+++ b/documentation/idioms/wrapper/diagram.pptx
@@ -106,7 +106,7 @@
   </p:defaultTextStyle>
   <p:extLst>
     <p:ext uri="{EFAFB233-063F-42B5-8137-9DF3F51BA10A}">
-      <p15:sldGuideLst xmlns:p15="http://schemas.microsoft.com/office/powerpoint/2012/main">
+      <p15:sldGuideLst xmlns="" xmlns:p15="http://schemas.microsoft.com/office/powerpoint/2012/main">
         <p15:guide id="1" orient="horz" pos="2160">
           <p15:clr>
             <a:srgbClr val="A4A3A4"/>
@@ -304,7 +304,7 @@
           <a:p>
             <a:fld id="{13F24B86-36D2-4655-BE2F-98B661AC85E1}" type="datetimeFigureOut">
               <a:rPr lang="en-US" smtClean="0"/>
-              <a:t>10/28/2014</a:t>
+              <a:t>5/7/15</a:t>
             </a:fld>
             <a:endParaRPr lang="en-US"/>
           </a:p>
@@ -474,7 +474,7 @@
           <a:p>
             <a:fld id="{13F24B86-36D2-4655-BE2F-98B661AC85E1}" type="datetimeFigureOut">
               <a:rPr lang="en-US" smtClean="0"/>
-              <a:t>10/28/2014</a:t>
+              <a:t>5/7/15</a:t>
             </a:fld>
             <a:endParaRPr lang="en-US"/>
           </a:p>
@@ -654,7 +654,7 @@
           <a:p>
             <a:fld id="{13F24B86-36D2-4655-BE2F-98B661AC85E1}" type="datetimeFigureOut">
               <a:rPr lang="en-US" smtClean="0"/>
-              <a:t>10/28/2014</a:t>
+              <a:t>5/7/15</a:t>
             </a:fld>
             <a:endParaRPr lang="en-US"/>
           </a:p>
@@ -824,7 +824,7 @@
           <a:p>
             <a:fld id="{13F24B86-36D2-4655-BE2F-98B661AC85E1}" type="datetimeFigureOut">
               <a:rPr lang="en-US" smtClean="0"/>
-              <a:t>10/28/2014</a:t>
+              <a:t>5/7/15</a:t>
             </a:fld>
             <a:endParaRPr lang="en-US"/>
           </a:p>
@@ -1070,7 +1070,7 @@
           <a:p>
             <a:fld id="{13F24B86-36D2-4655-BE2F-98B661AC85E1}" type="datetimeFigureOut">
               <a:rPr lang="en-US" smtClean="0"/>
-              <a:t>10/28/2014</a:t>
+              <a:t>5/7/15</a:t>
             </a:fld>
             <a:endParaRPr lang="en-US"/>
           </a:p>
@@ -1358,7 +1358,7 @@
           <a:p>
             <a:fld id="{13F24B86-36D2-4655-BE2F-98B661AC85E1}" type="datetimeFigureOut">
               <a:rPr lang="en-US" smtClean="0"/>
-              <a:t>10/28/2014</a:t>
+              <a:t>5/7/15</a:t>
             </a:fld>
             <a:endParaRPr lang="en-US"/>
           </a:p>
@@ -1780,7 +1780,7 @@
           <a:p>
             <a:fld id="{13F24B86-36D2-4655-BE2F-98B661AC85E1}" type="datetimeFigureOut">
               <a:rPr lang="en-US" smtClean="0"/>
-              <a:t>10/28/2014</a:t>
+              <a:t>5/7/15</a:t>
             </a:fld>
             <a:endParaRPr lang="en-US"/>
           </a:p>
@@ -1898,7 +1898,7 @@
           <a:p>
             <a:fld id="{13F24B86-36D2-4655-BE2F-98B661AC85E1}" type="datetimeFigureOut">
               <a:rPr lang="en-US" smtClean="0"/>
-              <a:t>10/28/2014</a:t>
+              <a:t>5/7/15</a:t>
             </a:fld>
             <a:endParaRPr lang="en-US"/>
           </a:p>
@@ -1993,7 +1993,7 @@
           <a:p>
             <a:fld id="{13F24B86-36D2-4655-BE2F-98B661AC85E1}" type="datetimeFigureOut">
               <a:rPr lang="en-US" smtClean="0"/>
-              <a:t>10/28/2014</a:t>
+              <a:t>5/7/15</a:t>
             </a:fld>
             <a:endParaRPr lang="en-US"/>
           </a:p>
@@ -2270,7 +2270,7 @@
           <a:p>
             <a:fld id="{13F24B86-36D2-4655-BE2F-98B661AC85E1}" type="datetimeFigureOut">
               <a:rPr lang="en-US" smtClean="0"/>
-              <a:t>10/28/2014</a:t>
+              <a:t>5/7/15</a:t>
             </a:fld>
             <a:endParaRPr lang="en-US"/>
           </a:p>
@@ -2523,7 +2523,7 @@
           <a:p>
             <a:fld id="{13F24B86-36D2-4655-BE2F-98B661AC85E1}" type="datetimeFigureOut">
               <a:rPr lang="en-US" smtClean="0"/>
-              <a:t>10/28/2014</a:t>
+              <a:t>5/7/15</a:t>
             </a:fld>
             <a:endParaRPr lang="en-US"/>
           </a:p>
@@ -2736,7 +2736,7 @@
           <a:p>
             <a:fld id="{13F24B86-36D2-4655-BE2F-98B661AC85E1}" type="datetimeFigureOut">
               <a:rPr lang="en-US" smtClean="0"/>
-              <a:t>10/28/2014</a:t>
+              <a:t>5/7/15</a:t>
             </a:fld>
             <a:endParaRPr lang="en-US"/>
           </a:p>
@@ -3120,14 +3120,14 @@
           <p:nvPr>
             <p:extLst>
               <p:ext uri="{D42A27DB-BD31-4B8C-83A1-F6EECF244321}">
-                <p14:modId xmlns:p14="http://schemas.microsoft.com/office/powerpoint/2010/main" val="1590912230"/>
+                <p14:modId xmlns:p14="http://schemas.microsoft.com/office/powerpoint/2010/main" val="2066110182"/>
               </p:ext>
             </p:extLst>
           </p:nvPr>
         </p:nvGraphicFramePr>
         <p:xfrm>
           <a:off x="431256" y="140931"/>
-          <a:ext cx="7769769" cy="7223760"/>
+          <a:ext cx="7769769" cy="8260080"/>
         </p:xfrm>
         <a:graphic>
           <a:graphicData uri="http://schemas.openxmlformats.org/drawingml/2006/table">
@@ -3804,8 +3804,892 @@
                     <a:lstStyle/>
                     <a:p>
                       <a:r>
+                        <a:rPr lang="en-US" sz="1100" b="0" dirty="0" smtClean="0"/>
+                        <a:t>Campaigns</a:t>
+                      </a:r>
+                      <a:endParaRPr lang="en-US" sz="1100" b="0" dirty="0"/>
+                    </a:p>
+                  </a:txBody>
+                  <a:tcPr>
+                    <a:lnL w="12700" cap="flat" cmpd="sng" algn="ctr">
+                      <a:solidFill>
+                        <a:schemeClr val="tx1"/>
+                      </a:solidFill>
+                      <a:prstDash val="solid"/>
+                      <a:round/>
+                      <a:headEnd type="none" w="med" len="med"/>
+                      <a:tailEnd type="none" w="med" len="med"/>
+                    </a:lnL>
+                    <a:lnR w="12700" cap="flat" cmpd="sng" algn="ctr">
+                      <a:solidFill>
+                        <a:schemeClr val="tx1"/>
+                      </a:solidFill>
+                      <a:prstDash val="solid"/>
+                      <a:round/>
+                      <a:headEnd type="none" w="med" len="med"/>
+                      <a:tailEnd type="none" w="med" len="med"/>
+                    </a:lnR>
+                  </a:tcPr>
+                </a:tc>
+                <a:tc gridSpan="3">
+                  <a:txBody>
+                    <a:bodyPr/>
+                    <a:lstStyle/>
+                    <a:p>
+                      <a:endParaRPr lang="en-US" sz="1100" dirty="0" smtClean="0"/>
+                    </a:p>
+                  </a:txBody>
+                  <a:tcPr>
+                    <a:lnL w="12700" cap="flat" cmpd="sng" algn="ctr">
+                      <a:solidFill>
+                        <a:schemeClr val="tx1"/>
+                      </a:solidFill>
+                      <a:prstDash val="solid"/>
+                      <a:round/>
+                      <a:headEnd type="none" w="med" len="med"/>
+                      <a:tailEnd type="none" w="med" len="med"/>
+                    </a:lnL>
+                    <a:lnR w="12700" cap="flat" cmpd="sng" algn="ctr">
+                      <a:solidFill>
+                        <a:schemeClr val="tx1"/>
+                      </a:solidFill>
+                      <a:prstDash val="solid"/>
+                      <a:round/>
+                      <a:headEnd type="none" w="med" len="med"/>
+                      <a:tailEnd type="none" w="med" len="med"/>
+                    </a:lnR>
+                    <a:lnT w="12700" cap="flat" cmpd="sng" algn="ctr">
+                      <a:noFill/>
+                      <a:prstDash val="solid"/>
+                      <a:round/>
+                      <a:headEnd type="none" w="med" len="med"/>
+                      <a:tailEnd type="none" w="med" len="med"/>
+                    </a:lnT>
+                    <a:lnB w="12700" cap="flat" cmpd="sng" algn="ctr">
+                      <a:noFill/>
+                      <a:prstDash val="solid"/>
+                      <a:round/>
+                      <a:headEnd type="none" w="med" len="med"/>
+                      <a:tailEnd type="none" w="med" len="med"/>
+                    </a:lnB>
+                    <a:lnTlToBr w="12700" cmpd="sng">
+                      <a:noFill/>
+                      <a:prstDash val="solid"/>
+                    </a:lnTlToBr>
+                    <a:lnBlToTr w="12700" cmpd="sng">
+                      <a:noFill/>
+                      <a:prstDash val="solid"/>
+                    </a:lnBlToTr>
+                  </a:tcPr>
+                </a:tc>
+                <a:tc hMerge="1">
+                  <a:txBody>
+                    <a:bodyPr/>
+                    <a:lstStyle/>
+                    <a:p>
+                      <a:endParaRPr lang="en-US"/>
+                    </a:p>
+                  </a:txBody>
+                  <a:tcPr/>
+                </a:tc>
+                <a:tc hMerge="1">
+                  <a:txBody>
+                    <a:bodyPr/>
+                    <a:lstStyle/>
+                    <a:p>
+                      <a:endParaRPr lang="en-US"/>
+                    </a:p>
+                  </a:txBody>
+                  <a:tcPr/>
+                </a:tc>
+              </a:tr>
+              <a:tr h="0">
+                <a:tc>
+                  <a:txBody>
+                    <a:bodyPr/>
+                    <a:lstStyle/>
+                    <a:p>
+                      <a:r>
+                        <a:rPr lang="en-US" sz="1100" b="0" dirty="0" smtClean="0"/>
+                        <a:t>    Campaign</a:t>
+                      </a:r>
+                      <a:endParaRPr lang="en-US" sz="1100" b="0" dirty="0"/>
+                    </a:p>
+                  </a:txBody>
+                  <a:tcPr>
+                    <a:lnL w="12700" cap="flat" cmpd="sng" algn="ctr">
+                      <a:solidFill>
+                        <a:schemeClr val="tx1"/>
+                      </a:solidFill>
+                      <a:prstDash val="solid"/>
+                      <a:round/>
+                      <a:headEnd type="none" w="med" len="med"/>
+                      <a:tailEnd type="none" w="med" len="med"/>
+                    </a:lnL>
+                    <a:lnR w="12700" cap="flat" cmpd="sng" algn="ctr">
+                      <a:solidFill>
+                        <a:schemeClr val="tx1"/>
+                      </a:solidFill>
+                      <a:prstDash val="solid"/>
+                      <a:round/>
+                      <a:headEnd type="none" w="med" len="med"/>
+                      <a:tailEnd type="none" w="med" len="med"/>
+                    </a:lnR>
+                  </a:tcPr>
+                </a:tc>
+                <a:tc gridSpan="3">
+                  <a:txBody>
+                    <a:bodyPr/>
+                    <a:lstStyle/>
+                    <a:p>
+                      <a:pPr marL="0" marR="0" indent="0" algn="l" defTabSz="914400" rtl="0" eaLnBrk="1" fontAlgn="auto" latinLnBrk="0" hangingPunct="1">
+                        <a:lnSpc>
+                          <a:spcPct val="100000"/>
+                        </a:lnSpc>
+                        <a:spcBef>
+                          <a:spcPts val="0"/>
+                        </a:spcBef>
+                        <a:spcAft>
+                          <a:spcPts val="0"/>
+                        </a:spcAft>
+                        <a:buClrTx/>
+                        <a:buSzTx/>
+                        <a:buFontTx/>
+                        <a:buNone/>
+                        <a:tabLst/>
+                        <a:defRPr/>
+                      </a:pPr>
+                      <a:endParaRPr lang="en-US" sz="1100" dirty="0" smtClean="0"/>
+                    </a:p>
+                  </a:txBody>
+                  <a:tcPr>
+                    <a:lnL w="12700" cap="flat" cmpd="sng" algn="ctr">
+                      <a:solidFill>
+                        <a:schemeClr val="tx1"/>
+                      </a:solidFill>
+                      <a:prstDash val="solid"/>
+                      <a:round/>
+                      <a:headEnd type="none" w="med" len="med"/>
+                      <a:tailEnd type="none" w="med" len="med"/>
+                    </a:lnL>
+                    <a:lnR w="12700" cap="flat" cmpd="sng" algn="ctr">
+                      <a:solidFill>
+                        <a:schemeClr val="tx1"/>
+                      </a:solidFill>
+                      <a:prstDash val="solid"/>
+                      <a:round/>
+                      <a:headEnd type="none" w="med" len="med"/>
+                      <a:tailEnd type="none" w="med" len="med"/>
+                    </a:lnR>
+                    <a:lnT w="12700" cap="flat" cmpd="sng" algn="ctr">
+                      <a:noFill/>
+                      <a:prstDash val="solid"/>
+                      <a:round/>
+                      <a:headEnd type="none" w="med" len="med"/>
+                      <a:tailEnd type="none" w="med" len="med"/>
+                    </a:lnT>
+                    <a:lnB w="12700" cap="flat" cmpd="sng" algn="ctr">
+                      <a:noFill/>
+                      <a:prstDash val="solid"/>
+                      <a:round/>
+                      <a:headEnd type="none" w="med" len="med"/>
+                      <a:tailEnd type="none" w="med" len="med"/>
+                    </a:lnB>
+                    <a:lnTlToBr w="12700" cmpd="sng">
+                      <a:noFill/>
+                      <a:prstDash val="solid"/>
+                    </a:lnTlToBr>
+                    <a:lnBlToTr w="12700" cmpd="sng">
+                      <a:noFill/>
+                      <a:prstDash val="solid"/>
+                    </a:lnBlToTr>
+                  </a:tcPr>
+                </a:tc>
+                <a:tc hMerge="1">
+                  <a:txBody>
+                    <a:bodyPr/>
+                    <a:lstStyle/>
+                    <a:p>
+                      <a:endParaRPr lang="en-US"/>
+                    </a:p>
+                  </a:txBody>
+                  <a:tcPr/>
+                </a:tc>
+                <a:tc hMerge="1">
+                  <a:txBody>
+                    <a:bodyPr/>
+                    <a:lstStyle/>
+                    <a:p>
+                      <a:endParaRPr lang="en-US"/>
+                    </a:p>
+                  </a:txBody>
+                  <a:tcPr/>
+                </a:tc>
+              </a:tr>
+              <a:tr h="0">
+                <a:tc>
+                  <a:txBody>
+                    <a:bodyPr/>
+                    <a:lstStyle/>
+                    <a:p>
+                      <a:r>
+                        <a:rPr lang="en-US" sz="1100" b="0" dirty="0" smtClean="0"/>
+                        <a:t>        id</a:t>
+                      </a:r>
+                      <a:endParaRPr lang="en-US" sz="1100" b="0" dirty="0"/>
+                    </a:p>
+                  </a:txBody>
+                  <a:tcPr>
+                    <a:lnL w="12700" cap="flat" cmpd="sng" algn="ctr">
+                      <a:solidFill>
+                        <a:schemeClr val="tx1"/>
+                      </a:solidFill>
+                      <a:prstDash val="solid"/>
+                      <a:round/>
+                      <a:headEnd type="none" w="med" len="med"/>
+                      <a:tailEnd type="none" w="med" len="med"/>
+                    </a:lnL>
+                    <a:lnR w="12700" cap="flat" cmpd="sng" algn="ctr">
+                      <a:solidFill>
+                        <a:schemeClr val="tx1"/>
+                      </a:solidFill>
+                      <a:prstDash val="solid"/>
+                      <a:round/>
+                      <a:headEnd type="none" w="med" len="med"/>
+                      <a:tailEnd type="none" w="med" len="med"/>
+                    </a:lnR>
+                  </a:tcPr>
+                </a:tc>
+                <a:tc gridSpan="3">
+                  <a:txBody>
+                    <a:bodyPr/>
+                    <a:lstStyle/>
+                    <a:p>
+                      <a:r>
                         <a:rPr lang="en-US" sz="1100" dirty="0" smtClean="0"/>
-                        <a:t>Related Package</a:t>
+                        <a:t>example:campaign-1855cb8a-d96c-4859-a450-abb1e7c061f2</a:t>
+                      </a:r>
+                      <a:endParaRPr lang="en-US" sz="1100" dirty="0" smtClean="0"/>
+                    </a:p>
+                  </a:txBody>
+                  <a:tcPr>
+                    <a:lnL w="12700" cap="flat" cmpd="sng" algn="ctr">
+                      <a:solidFill>
+                        <a:schemeClr val="tx1"/>
+                      </a:solidFill>
+                      <a:prstDash val="solid"/>
+                      <a:round/>
+                      <a:headEnd type="none" w="med" len="med"/>
+                      <a:tailEnd type="none" w="med" len="med"/>
+                    </a:lnL>
+                    <a:lnR w="12700" cap="flat" cmpd="sng" algn="ctr">
+                      <a:solidFill>
+                        <a:schemeClr val="tx1"/>
+                      </a:solidFill>
+                      <a:prstDash val="solid"/>
+                      <a:round/>
+                      <a:headEnd type="none" w="med" len="med"/>
+                      <a:tailEnd type="none" w="med" len="med"/>
+                    </a:lnR>
+                    <a:lnT w="12700" cap="flat" cmpd="sng" algn="ctr">
+                      <a:noFill/>
+                      <a:prstDash val="solid"/>
+                      <a:round/>
+                      <a:headEnd type="none" w="med" len="med"/>
+                      <a:tailEnd type="none" w="med" len="med"/>
+                    </a:lnT>
+                    <a:lnB w="12700" cap="flat" cmpd="sng" algn="ctr">
+                      <a:noFill/>
+                      <a:prstDash val="solid"/>
+                      <a:round/>
+                      <a:headEnd type="none" w="med" len="med"/>
+                      <a:tailEnd type="none" w="med" len="med"/>
+                    </a:lnB>
+                    <a:lnTlToBr w="12700" cmpd="sng">
+                      <a:noFill/>
+                      <a:prstDash val="solid"/>
+                    </a:lnTlToBr>
+                    <a:lnBlToTr w="12700" cmpd="sng">
+                      <a:noFill/>
+                      <a:prstDash val="solid"/>
+                    </a:lnBlToTr>
+                  </a:tcPr>
+                </a:tc>
+                <a:tc hMerge="1">
+                  <a:txBody>
+                    <a:bodyPr/>
+                    <a:lstStyle/>
+                    <a:p>
+                      <a:endParaRPr lang="en-US"/>
+                    </a:p>
+                  </a:txBody>
+                  <a:tcPr/>
+                </a:tc>
+                <a:tc hMerge="1">
+                  <a:txBody>
+                    <a:bodyPr/>
+                    <a:lstStyle/>
+                    <a:p>
+                      <a:endParaRPr lang="en-US"/>
+                    </a:p>
+                  </a:txBody>
+                  <a:tcPr/>
+                </a:tc>
+              </a:tr>
+              <a:tr h="0">
+                <a:tc>
+                  <a:txBody>
+                    <a:bodyPr/>
+                    <a:lstStyle/>
+                    <a:p>
+                      <a:r>
+                        <a:rPr lang="en-US" sz="1100" b="0" dirty="0" smtClean="0"/>
+                        <a:t>        Title</a:t>
+                      </a:r>
+                      <a:endParaRPr lang="en-US" sz="1100" b="0" dirty="0"/>
+                    </a:p>
+                  </a:txBody>
+                  <a:tcPr>
+                    <a:lnL w="12700" cap="flat" cmpd="sng" algn="ctr">
+                      <a:solidFill>
+                        <a:schemeClr val="tx1"/>
+                      </a:solidFill>
+                      <a:prstDash val="solid"/>
+                      <a:round/>
+                      <a:headEnd type="none" w="med" len="med"/>
+                      <a:tailEnd type="none" w="med" len="med"/>
+                    </a:lnL>
+                    <a:lnR w="12700" cap="flat" cmpd="sng" algn="ctr">
+                      <a:solidFill>
+                        <a:schemeClr val="tx1"/>
+                      </a:solidFill>
+                      <a:prstDash val="solid"/>
+                      <a:round/>
+                      <a:headEnd type="none" w="med" len="med"/>
+                      <a:tailEnd type="none" w="med" len="med"/>
+                    </a:lnR>
+                  </a:tcPr>
+                </a:tc>
+                <a:tc gridSpan="3">
+                  <a:txBody>
+                    <a:bodyPr/>
+                    <a:lstStyle/>
+                    <a:p>
+                      <a:r>
+                        <a:rPr lang="en-US" sz="1100" dirty="0" smtClean="0"/>
+                        <a:t>Campaign</a:t>
+                      </a:r>
+                      <a:r>
+                        <a:rPr lang="en-US" sz="1100" baseline="0" dirty="0" smtClean="0"/>
+                        <a:t> against ICS</a:t>
+                      </a:r>
+                      <a:endParaRPr lang="en-US" sz="1100" dirty="0" smtClean="0"/>
+                    </a:p>
+                  </a:txBody>
+                  <a:tcPr>
+                    <a:lnL w="12700" cap="flat" cmpd="sng" algn="ctr">
+                      <a:solidFill>
+                        <a:schemeClr val="tx1"/>
+                      </a:solidFill>
+                      <a:prstDash val="solid"/>
+                      <a:round/>
+                      <a:headEnd type="none" w="med" len="med"/>
+                      <a:tailEnd type="none" w="med" len="med"/>
+                    </a:lnL>
+                    <a:lnR w="12700" cap="flat" cmpd="sng" algn="ctr">
+                      <a:solidFill>
+                        <a:schemeClr val="tx1"/>
+                      </a:solidFill>
+                      <a:prstDash val="solid"/>
+                      <a:round/>
+                      <a:headEnd type="none" w="med" len="med"/>
+                      <a:tailEnd type="none" w="med" len="med"/>
+                    </a:lnR>
+                    <a:lnT w="12700" cap="flat" cmpd="sng" algn="ctr">
+                      <a:noFill/>
+                      <a:prstDash val="solid"/>
+                      <a:round/>
+                      <a:headEnd type="none" w="med" len="med"/>
+                      <a:tailEnd type="none" w="med" len="med"/>
+                    </a:lnT>
+                    <a:lnB w="12700" cap="flat" cmpd="sng" algn="ctr">
+                      <a:noFill/>
+                      <a:prstDash val="solid"/>
+                      <a:round/>
+                      <a:headEnd type="none" w="med" len="med"/>
+                      <a:tailEnd type="none" w="med" len="med"/>
+                    </a:lnB>
+                    <a:lnTlToBr w="12700" cmpd="sng">
+                      <a:noFill/>
+                      <a:prstDash val="solid"/>
+                    </a:lnTlToBr>
+                    <a:lnBlToTr w="12700" cmpd="sng">
+                      <a:noFill/>
+                      <a:prstDash val="solid"/>
+                    </a:lnBlToTr>
+                  </a:tcPr>
+                </a:tc>
+                <a:tc hMerge="1">
+                  <a:txBody>
+                    <a:bodyPr/>
+                    <a:lstStyle/>
+                    <a:p>
+                      <a:endParaRPr lang="en-US"/>
+                    </a:p>
+                  </a:txBody>
+                  <a:tcPr/>
+                </a:tc>
+                <a:tc hMerge="1">
+                  <a:txBody>
+                    <a:bodyPr/>
+                    <a:lstStyle/>
+                    <a:p>
+                      <a:endParaRPr lang="en-US"/>
+                    </a:p>
+                  </a:txBody>
+                  <a:tcPr/>
+                </a:tc>
+              </a:tr>
+              <a:tr h="0">
+                <a:tc>
+                  <a:txBody>
+                    <a:bodyPr/>
+                    <a:lstStyle/>
+                    <a:p>
+                      <a:r>
+                        <a:rPr lang="en-US" sz="1100" b="0" dirty="0" smtClean="0"/>
+                        <a:t>TTPs</a:t>
+                      </a:r>
+                      <a:endParaRPr lang="en-US" sz="1100" b="0" dirty="0"/>
+                    </a:p>
+                  </a:txBody>
+                  <a:tcPr>
+                    <a:lnL w="12700" cap="flat" cmpd="sng" algn="ctr">
+                      <a:solidFill>
+                        <a:schemeClr val="tx1"/>
+                      </a:solidFill>
+                      <a:prstDash val="solid"/>
+                      <a:round/>
+                      <a:headEnd type="none" w="med" len="med"/>
+                      <a:tailEnd type="none" w="med" len="med"/>
+                    </a:lnL>
+                    <a:lnR w="12700" cap="flat" cmpd="sng" algn="ctr">
+                      <a:solidFill>
+                        <a:schemeClr val="tx1"/>
+                      </a:solidFill>
+                      <a:prstDash val="solid"/>
+                      <a:round/>
+                      <a:headEnd type="none" w="med" len="med"/>
+                      <a:tailEnd type="none" w="med" len="med"/>
+                    </a:lnR>
+                  </a:tcPr>
+                </a:tc>
+                <a:tc gridSpan="3">
+                  <a:txBody>
+                    <a:bodyPr/>
+                    <a:lstStyle/>
+                    <a:p>
+                      <a:endParaRPr lang="en-US" sz="1100" dirty="0" smtClean="0"/>
+                    </a:p>
+                  </a:txBody>
+                  <a:tcPr>
+                    <a:lnL w="12700" cap="flat" cmpd="sng" algn="ctr">
+                      <a:solidFill>
+                        <a:schemeClr val="tx1"/>
+                      </a:solidFill>
+                      <a:prstDash val="solid"/>
+                      <a:round/>
+                      <a:headEnd type="none" w="med" len="med"/>
+                      <a:tailEnd type="none" w="med" len="med"/>
+                    </a:lnL>
+                    <a:lnR w="12700" cap="flat" cmpd="sng" algn="ctr">
+                      <a:solidFill>
+                        <a:schemeClr val="tx1"/>
+                      </a:solidFill>
+                      <a:prstDash val="solid"/>
+                      <a:round/>
+                      <a:headEnd type="none" w="med" len="med"/>
+                      <a:tailEnd type="none" w="med" len="med"/>
+                    </a:lnR>
+                    <a:lnT w="12700" cap="flat" cmpd="sng" algn="ctr">
+                      <a:noFill/>
+                      <a:prstDash val="solid"/>
+                      <a:round/>
+                      <a:headEnd type="none" w="med" len="med"/>
+                      <a:tailEnd type="none" w="med" len="med"/>
+                    </a:lnT>
+                    <a:lnB w="12700" cap="flat" cmpd="sng" algn="ctr">
+                      <a:noFill/>
+                      <a:prstDash val="solid"/>
+                      <a:round/>
+                      <a:headEnd type="none" w="med" len="med"/>
+                      <a:tailEnd type="none" w="med" len="med"/>
+                    </a:lnB>
+                    <a:lnTlToBr w="12700" cmpd="sng">
+                      <a:noFill/>
+                      <a:prstDash val="solid"/>
+                    </a:lnTlToBr>
+                    <a:lnBlToTr w="12700" cmpd="sng">
+                      <a:noFill/>
+                      <a:prstDash val="solid"/>
+                    </a:lnBlToTr>
+                  </a:tcPr>
+                </a:tc>
+                <a:tc hMerge="1">
+                  <a:txBody>
+                    <a:bodyPr/>
+                    <a:lstStyle/>
+                    <a:p>
+                      <a:endParaRPr lang="en-US"/>
+                    </a:p>
+                  </a:txBody>
+                  <a:tcPr/>
+                </a:tc>
+                <a:tc hMerge="1">
+                  <a:txBody>
+                    <a:bodyPr/>
+                    <a:lstStyle/>
+                    <a:p>
+                      <a:endParaRPr lang="en-US"/>
+                    </a:p>
+                  </a:txBody>
+                  <a:tcPr/>
+                </a:tc>
+              </a:tr>
+              <a:tr h="0">
+                <a:tc>
+                  <a:txBody>
+                    <a:bodyPr/>
+                    <a:lstStyle/>
+                    <a:p>
+                      <a:r>
+                        <a:rPr lang="en-US" sz="1100" b="0" dirty="0" smtClean="0"/>
+                        <a:t>    TTP</a:t>
+                      </a:r>
+                      <a:endParaRPr lang="en-US" sz="1100" b="0" dirty="0"/>
+                    </a:p>
+                  </a:txBody>
+                  <a:tcPr>
+                    <a:lnL w="12700" cap="flat" cmpd="sng" algn="ctr">
+                      <a:solidFill>
+                        <a:schemeClr val="tx1"/>
+                      </a:solidFill>
+                      <a:prstDash val="solid"/>
+                      <a:round/>
+                      <a:headEnd type="none" w="med" len="med"/>
+                      <a:tailEnd type="none" w="med" len="med"/>
+                    </a:lnL>
+                    <a:lnR w="12700" cap="flat" cmpd="sng" algn="ctr">
+                      <a:solidFill>
+                        <a:schemeClr val="tx1"/>
+                      </a:solidFill>
+                      <a:prstDash val="solid"/>
+                      <a:round/>
+                      <a:headEnd type="none" w="med" len="med"/>
+                      <a:tailEnd type="none" w="med" len="med"/>
+                    </a:lnR>
+                  </a:tcPr>
+                </a:tc>
+                <a:tc gridSpan="3">
+                  <a:txBody>
+                    <a:bodyPr/>
+                    <a:lstStyle/>
+                    <a:p>
+                      <a:endParaRPr lang="en-US" sz="1100" dirty="0" smtClean="0"/>
+                    </a:p>
+                  </a:txBody>
+                  <a:tcPr>
+                    <a:lnL w="12700" cap="flat" cmpd="sng" algn="ctr">
+                      <a:solidFill>
+                        <a:schemeClr val="tx1"/>
+                      </a:solidFill>
+                      <a:prstDash val="solid"/>
+                      <a:round/>
+                      <a:headEnd type="none" w="med" len="med"/>
+                      <a:tailEnd type="none" w="med" len="med"/>
+                    </a:lnL>
+                    <a:lnR w="12700" cap="flat" cmpd="sng" algn="ctr">
+                      <a:solidFill>
+                        <a:schemeClr val="tx1"/>
+                      </a:solidFill>
+                      <a:prstDash val="solid"/>
+                      <a:round/>
+                      <a:headEnd type="none" w="med" len="med"/>
+                      <a:tailEnd type="none" w="med" len="med"/>
+                    </a:lnR>
+                    <a:lnT w="12700" cap="flat" cmpd="sng" algn="ctr">
+                      <a:noFill/>
+                      <a:prstDash val="solid"/>
+                      <a:round/>
+                      <a:headEnd type="none" w="med" len="med"/>
+                      <a:tailEnd type="none" w="med" len="med"/>
+                    </a:lnT>
+                    <a:lnB w="12700" cap="flat" cmpd="sng" algn="ctr">
+                      <a:noFill/>
+                      <a:prstDash val="solid"/>
+                      <a:round/>
+                      <a:headEnd type="none" w="med" len="med"/>
+                      <a:tailEnd type="none" w="med" len="med"/>
+                    </a:lnB>
+                    <a:lnTlToBr w="12700" cmpd="sng">
+                      <a:noFill/>
+                      <a:prstDash val="solid"/>
+                    </a:lnTlToBr>
+                    <a:lnBlToTr w="12700" cmpd="sng">
+                      <a:noFill/>
+                      <a:prstDash val="solid"/>
+                    </a:lnBlToTr>
+                  </a:tcPr>
+                </a:tc>
+                <a:tc hMerge="1">
+                  <a:txBody>
+                    <a:bodyPr/>
+                    <a:lstStyle/>
+                    <a:p>
+                      <a:endParaRPr lang="en-US"/>
+                    </a:p>
+                  </a:txBody>
+                  <a:tcPr/>
+                </a:tc>
+                <a:tc hMerge="1">
+                  <a:txBody>
+                    <a:bodyPr/>
+                    <a:lstStyle/>
+                    <a:p>
+                      <a:endParaRPr lang="en-US"/>
+                    </a:p>
+                  </a:txBody>
+                  <a:tcPr/>
+                </a:tc>
+              </a:tr>
+              <a:tr h="0">
+                <a:tc>
+                  <a:txBody>
+                    <a:bodyPr/>
+                    <a:lstStyle/>
+                    <a:p>
+                      <a:r>
+                        <a:rPr lang="en-US" sz="1100" b="0" dirty="0" smtClean="0"/>
+                        <a:t>        id</a:t>
+                      </a:r>
+                      <a:endParaRPr lang="en-US" sz="1100" b="0" dirty="0"/>
+                    </a:p>
+                  </a:txBody>
+                  <a:tcPr>
+                    <a:lnL w="12700" cap="flat" cmpd="sng" algn="ctr">
+                      <a:solidFill>
+                        <a:schemeClr val="tx1"/>
+                      </a:solidFill>
+                      <a:prstDash val="solid"/>
+                      <a:round/>
+                      <a:headEnd type="none" w="med" len="med"/>
+                      <a:tailEnd type="none" w="med" len="med"/>
+                    </a:lnL>
+                    <a:lnR w="12700" cap="flat" cmpd="sng" algn="ctr">
+                      <a:solidFill>
+                        <a:schemeClr val="tx1"/>
+                      </a:solidFill>
+                      <a:prstDash val="solid"/>
+                      <a:round/>
+                      <a:headEnd type="none" w="med" len="med"/>
+                      <a:tailEnd type="none" w="med" len="med"/>
+                    </a:lnR>
+                  </a:tcPr>
+                </a:tc>
+                <a:tc gridSpan="3">
+                  <a:txBody>
+                    <a:bodyPr/>
+                    <a:lstStyle/>
+                    <a:p>
+                      <a:r>
+                        <a:rPr lang="en-US" sz="1100" dirty="0" smtClean="0"/>
+                        <a:t>example:ttp-66647c79-5766-4ca7-ab8a-a579056e3c83</a:t>
+                      </a:r>
+                    </a:p>
+                  </a:txBody>
+                  <a:tcPr>
+                    <a:lnL w="12700" cap="flat" cmpd="sng" algn="ctr">
+                      <a:solidFill>
+                        <a:schemeClr val="tx1"/>
+                      </a:solidFill>
+                      <a:prstDash val="solid"/>
+                      <a:round/>
+                      <a:headEnd type="none" w="med" len="med"/>
+                      <a:tailEnd type="none" w="med" len="med"/>
+                    </a:lnL>
+                    <a:lnR w="12700" cap="flat" cmpd="sng" algn="ctr">
+                      <a:solidFill>
+                        <a:schemeClr val="tx1"/>
+                      </a:solidFill>
+                      <a:prstDash val="solid"/>
+                      <a:round/>
+                      <a:headEnd type="none" w="med" len="med"/>
+                      <a:tailEnd type="none" w="med" len="med"/>
+                    </a:lnR>
+                    <a:lnT w="12700" cap="flat" cmpd="sng" algn="ctr">
+                      <a:noFill/>
+                      <a:prstDash val="solid"/>
+                      <a:round/>
+                      <a:headEnd type="none" w="med" len="med"/>
+                      <a:tailEnd type="none" w="med" len="med"/>
+                    </a:lnT>
+                    <a:lnB w="12700" cap="flat" cmpd="sng" algn="ctr">
+                      <a:noFill/>
+                      <a:prstDash val="solid"/>
+                      <a:round/>
+                      <a:headEnd type="none" w="med" len="med"/>
+                      <a:tailEnd type="none" w="med" len="med"/>
+                    </a:lnB>
+                    <a:lnTlToBr w="12700" cmpd="sng">
+                      <a:noFill/>
+                      <a:prstDash val="solid"/>
+                    </a:lnTlToBr>
+                    <a:lnBlToTr w="12700" cmpd="sng">
+                      <a:noFill/>
+                      <a:prstDash val="solid"/>
+                    </a:lnBlToTr>
+                  </a:tcPr>
+                </a:tc>
+                <a:tc hMerge="1">
+                  <a:txBody>
+                    <a:bodyPr/>
+                    <a:lstStyle/>
+                    <a:p>
+                      <a:endParaRPr lang="en-US"/>
+                    </a:p>
+                  </a:txBody>
+                  <a:tcPr/>
+                </a:tc>
+                <a:tc hMerge="1">
+                  <a:txBody>
+                    <a:bodyPr/>
+                    <a:lstStyle/>
+                    <a:p>
+                      <a:endParaRPr lang="en-US"/>
+                    </a:p>
+                  </a:txBody>
+                  <a:tcPr/>
+                </a:tc>
+              </a:tr>
+              <a:tr h="0">
+                <a:tc>
+                  <a:txBody>
+                    <a:bodyPr/>
+                    <a:lstStyle/>
+                    <a:p>
+                      <a:r>
+                        <a:rPr lang="en-US" sz="1100" b="0" dirty="0" smtClean="0"/>
+                        <a:t>        Title</a:t>
+                      </a:r>
+                      <a:endParaRPr lang="en-US" sz="1100" b="0" dirty="0"/>
+                    </a:p>
+                  </a:txBody>
+                  <a:tcPr>
+                    <a:lnL w="12700" cap="flat" cmpd="sng" algn="ctr">
+                      <a:solidFill>
+                        <a:schemeClr val="tx1"/>
+                      </a:solidFill>
+                      <a:prstDash val="solid"/>
+                      <a:round/>
+                      <a:headEnd type="none" w="med" len="med"/>
+                      <a:tailEnd type="none" w="med" len="med"/>
+                    </a:lnL>
+                    <a:lnR w="12700" cap="flat" cmpd="sng" algn="ctr">
+                      <a:solidFill>
+                        <a:schemeClr val="tx1"/>
+                      </a:solidFill>
+                      <a:prstDash val="solid"/>
+                      <a:round/>
+                      <a:headEnd type="none" w="med" len="med"/>
+                      <a:tailEnd type="none" w="med" len="med"/>
+                    </a:lnR>
+                  </a:tcPr>
+                </a:tc>
+                <a:tc gridSpan="3">
+                  <a:txBody>
+                    <a:bodyPr/>
+                    <a:lstStyle/>
+                    <a:p>
+                      <a:r>
+                        <a:rPr lang="en-US" sz="1100" dirty="0" err="1" smtClean="0"/>
+                        <a:t>DrownedRat</a:t>
+                      </a:r>
+                      <a:endParaRPr lang="en-US" sz="1100" dirty="0" smtClean="0"/>
+                    </a:p>
+                  </a:txBody>
+                  <a:tcPr>
+                    <a:lnL w="12700" cap="flat" cmpd="sng" algn="ctr">
+                      <a:solidFill>
+                        <a:schemeClr val="tx1"/>
+                      </a:solidFill>
+                      <a:prstDash val="solid"/>
+                      <a:round/>
+                      <a:headEnd type="none" w="med" len="med"/>
+                      <a:tailEnd type="none" w="med" len="med"/>
+                    </a:lnL>
+                    <a:lnR w="12700" cap="flat" cmpd="sng" algn="ctr">
+                      <a:solidFill>
+                        <a:schemeClr val="tx1"/>
+                      </a:solidFill>
+                      <a:prstDash val="solid"/>
+                      <a:round/>
+                      <a:headEnd type="none" w="med" len="med"/>
+                      <a:tailEnd type="none" w="med" len="med"/>
+                    </a:lnR>
+                    <a:lnT w="12700" cap="flat" cmpd="sng" algn="ctr">
+                      <a:noFill/>
+                      <a:prstDash val="solid"/>
+                      <a:round/>
+                      <a:headEnd type="none" w="med" len="med"/>
+                      <a:tailEnd type="none" w="med" len="med"/>
+                    </a:lnT>
+                    <a:lnB w="12700" cap="flat" cmpd="sng" algn="ctr">
+                      <a:noFill/>
+                      <a:prstDash val="solid"/>
+                      <a:round/>
+                      <a:headEnd type="none" w="med" len="med"/>
+                      <a:tailEnd type="none" w="med" len="med"/>
+                    </a:lnB>
+                    <a:lnTlToBr w="12700" cmpd="sng">
+                      <a:noFill/>
+                      <a:prstDash val="solid"/>
+                    </a:lnTlToBr>
+                    <a:lnBlToTr w="12700" cmpd="sng">
+                      <a:noFill/>
+                      <a:prstDash val="solid"/>
+                    </a:lnBlToTr>
+                  </a:tcPr>
+                </a:tc>
+                <a:tc hMerge="1">
+                  <a:txBody>
+                    <a:bodyPr/>
+                    <a:lstStyle/>
+                    <a:p>
+                      <a:endParaRPr lang="en-US"/>
+                    </a:p>
+                  </a:txBody>
+                  <a:tcPr/>
+                </a:tc>
+                <a:tc hMerge="1">
+                  <a:txBody>
+                    <a:bodyPr/>
+                    <a:lstStyle/>
+                    <a:p>
+                      <a:endParaRPr lang="en-US"/>
+                    </a:p>
+                  </a:txBody>
+                  <a:tcPr/>
+                </a:tc>
+              </a:tr>
+              <a:tr h="0">
+                <a:tc>
+                  <a:txBody>
+                    <a:bodyPr/>
+                    <a:lstStyle/>
+                    <a:p>
+                      <a:r>
+                        <a:rPr lang="en-US" sz="1100" dirty="0" smtClean="0"/>
+                        <a:t>Reports</a:t>
                       </a:r>
                       <a:endParaRPr lang="en-US" sz="1100" b="0" dirty="0"/>
                     </a:p>
@@ -3911,7 +4795,7 @@
                     <a:p>
                       <a:r>
                         <a:rPr lang="en-US" sz="1100" b="0" baseline="0" dirty="0" smtClean="0"/>
-                        <a:t>    Package</a:t>
+                        <a:t>    Report</a:t>
                       </a:r>
                       <a:endParaRPr lang="en-US" sz="1100" b="0" dirty="0"/>
                     </a:p>
@@ -3965,7 +4849,7 @@
                             <a:schemeClr val="bg1"/>
                           </a:solidFill>
                         </a:rPr>
-                        <a:t>Package</a:t>
+                        <a:t>Report</a:t>
                       </a:r>
                     </a:p>
                   </a:txBody>
@@ -4130,7 +5014,11 @@
                     <a:p>
                       <a:r>
                         <a:rPr lang="en-US" sz="1100" dirty="0" smtClean="0"/>
-                        <a:t>example:package-ca6e215c-fbb7-4b7a-b678-632562f85e93</a:t>
+                        <a:t>Example:report-</a:t>
+                      </a:r>
+                      <a:r>
+                        <a:rPr lang="en-US" sz="1100" dirty="0" smtClean="0"/>
+                        <a:t>ca6e215c-fbb7-4b7a-b678-632562f85e93</a:t>
                       </a:r>
                     </a:p>
                   </a:txBody>
@@ -4529,12 +5417,8 @@
                     <a:lstStyle/>
                     <a:p>
                       <a:r>
-                        <a:rPr lang="en-US" sz="1100" b="0" dirty="0" smtClean="0"/>
-                        <a:t>    Package</a:t>
-                      </a:r>
-                      <a:r>
                         <a:rPr lang="en-US" sz="1100" b="0" baseline="0" dirty="0" smtClean="0"/>
-                        <a:t> Intent</a:t>
+                        <a:t>    Intent</a:t>
                       </a:r>
                       <a:endParaRPr lang="en-US" sz="1100" b="0" dirty="0"/>
                     </a:p>
@@ -4656,7 +5540,17 @@
                             </a:schemeClr>
                           </a:solidFill>
                         </a:rPr>
-                        <a:t>PackageIntentVocab-1.0</a:t>
+                        <a:t>ReportIntentVocab</a:t>
+                      </a:r>
+                      <a:r>
+                        <a:rPr lang="en-US" sz="1100" b="0" dirty="0" smtClean="0">
+                          <a:solidFill>
+                            <a:schemeClr val="bg1">
+                              <a:lumMod val="50000"/>
+                            </a:schemeClr>
+                          </a:solidFill>
+                        </a:rPr>
+                        <a:t>-1.0</a:t>
                       </a:r>
                       <a:endParaRPr lang="en-US" sz="1100" b="0" dirty="0" smtClean="0">
                         <a:solidFill>
@@ -4747,7 +5641,7 @@
                     <a:p>
                       <a:r>
                         <a:rPr lang="en-US" sz="1100" b="0" dirty="0" smtClean="0"/>
-                        <a:t>    Handling</a:t>
+                        <a:t>Campaigns</a:t>
                       </a:r>
                       <a:endParaRPr lang="en-US" sz="1100" b="0" dirty="0"/>
                     </a:p>
@@ -4800,7 +5694,15 @@
                     <a:bodyPr/>
                     <a:lstStyle/>
                     <a:p>
-                      <a:endParaRPr lang="en-US" sz="1100"/>
+                      <a:pPr algn="l"/>
+                      <a:endParaRPr lang="en-US" sz="1100" b="0" dirty="0" smtClean="0">
+                        <a:solidFill>
+                          <a:schemeClr val="tx1">
+                            <a:lumMod val="95000"/>
+                            <a:lumOff val="5000"/>
+                          </a:schemeClr>
+                        </a:solidFill>
+                      </a:endParaRPr>
                     </a:p>
                   </a:txBody>
                   <a:tcPr>
@@ -4851,10 +5753,57 @@
                     <a:bodyPr/>
                     <a:lstStyle/>
                     <a:p>
-                      <a:endParaRPr lang="en-US"/>
-                    </a:p>
-                  </a:txBody>
-                  <a:tcPr/>
+                      <a:pPr algn="r"/>
+                      <a:endParaRPr lang="en-US" sz="1100" b="0" dirty="0" smtClean="0">
+                        <a:solidFill>
+                          <a:schemeClr val="tx1">
+                            <a:lumMod val="95000"/>
+                            <a:lumOff val="5000"/>
+                          </a:schemeClr>
+                        </a:solidFill>
+                      </a:endParaRPr>
+                    </a:p>
+                  </a:txBody>
+                  <a:tcPr>
+                    <a:lnL w="12700" cap="flat" cmpd="sng" algn="ctr">
+                      <a:noFill/>
+                      <a:prstDash val="solid"/>
+                      <a:round/>
+                      <a:headEnd type="none" w="med" len="med"/>
+                      <a:tailEnd type="none" w="med" len="med"/>
+                    </a:lnL>
+                    <a:lnR w="12700" cap="flat" cmpd="sng" algn="ctr">
+                      <a:solidFill>
+                        <a:schemeClr val="tx1"/>
+                      </a:solidFill>
+                      <a:prstDash val="solid"/>
+                      <a:round/>
+                      <a:headEnd type="none" w="med" len="med"/>
+                      <a:tailEnd type="none" w="med" len="med"/>
+                    </a:lnR>
+                    <a:lnT w="12700" cap="flat" cmpd="sng" algn="ctr">
+                      <a:noFill/>
+                      <a:prstDash val="solid"/>
+                      <a:round/>
+                      <a:headEnd type="none" w="med" len="med"/>
+                      <a:tailEnd type="none" w="med" len="med"/>
+                    </a:lnT>
+                    <a:lnB w="12700" cap="flat" cmpd="sng" algn="ctr">
+                      <a:noFill/>
+                      <a:prstDash val="solid"/>
+                      <a:round/>
+                      <a:headEnd type="none" w="med" len="med"/>
+                      <a:tailEnd type="none" w="med" len="med"/>
+                    </a:lnB>
+                    <a:lnTlToBr w="12700" cmpd="sng">
+                      <a:noFill/>
+                      <a:prstDash val="solid"/>
+                    </a:lnTlToBr>
+                    <a:lnBlToTr w="12700" cmpd="sng">
+                      <a:noFill/>
+                      <a:prstDash val="solid"/>
+                    </a:lnBlToTr>
+                  </a:tcPr>
                 </a:tc>
               </a:tr>
               <a:tr h="0">
@@ -4893,8 +5842,8 @@
                     <a:lstStyle/>
                     <a:p>
                       <a:r>
-                        <a:rPr lang="en-US" sz="1100" b="0" dirty="0" smtClean="0"/>
-                        <a:t>        Marking</a:t>
+                        <a:rPr lang="en-US" sz="1100" b="0" baseline="0" dirty="0" smtClean="0"/>
+                        <a:t>    Campaign</a:t>
                       </a:r>
                       <a:endParaRPr lang="en-US" sz="1100" b="0" dirty="0"/>
                     </a:p>
@@ -4947,7 +5896,15 @@
                     <a:bodyPr/>
                     <a:lstStyle/>
                     <a:p>
-                      <a:endParaRPr lang="en-US" sz="1100" dirty="0"/>
+                      <a:pPr algn="l"/>
+                      <a:endParaRPr lang="en-US" sz="1100" b="0" dirty="0" smtClean="0">
+                        <a:solidFill>
+                          <a:schemeClr val="tx1">
+                            <a:lumMod val="95000"/>
+                            <a:lumOff val="5000"/>
+                          </a:schemeClr>
+                        </a:solidFill>
+                      </a:endParaRPr>
                     </a:p>
                   </a:txBody>
                   <a:tcPr>
@@ -4998,10 +5955,57 @@
                     <a:bodyPr/>
                     <a:lstStyle/>
                     <a:p>
-                      <a:endParaRPr lang="en-US"/>
-                    </a:p>
-                  </a:txBody>
-                  <a:tcPr/>
+                      <a:pPr algn="r"/>
+                      <a:endParaRPr lang="en-US" sz="1100" b="0" dirty="0" smtClean="0">
+                        <a:solidFill>
+                          <a:schemeClr val="tx1">
+                            <a:lumMod val="95000"/>
+                            <a:lumOff val="5000"/>
+                          </a:schemeClr>
+                        </a:solidFill>
+                      </a:endParaRPr>
+                    </a:p>
+                  </a:txBody>
+                  <a:tcPr>
+                    <a:lnL w="12700" cap="flat" cmpd="sng" algn="ctr">
+                      <a:noFill/>
+                      <a:prstDash val="solid"/>
+                      <a:round/>
+                      <a:headEnd type="none" w="med" len="med"/>
+                      <a:tailEnd type="none" w="med" len="med"/>
+                    </a:lnL>
+                    <a:lnR w="12700" cap="flat" cmpd="sng" algn="ctr">
+                      <a:solidFill>
+                        <a:schemeClr val="tx1"/>
+                      </a:solidFill>
+                      <a:prstDash val="solid"/>
+                      <a:round/>
+                      <a:headEnd type="none" w="med" len="med"/>
+                      <a:tailEnd type="none" w="med" len="med"/>
+                    </a:lnR>
+                    <a:lnT w="12700" cap="flat" cmpd="sng" algn="ctr">
+                      <a:noFill/>
+                      <a:prstDash val="solid"/>
+                      <a:round/>
+                      <a:headEnd type="none" w="med" len="med"/>
+                      <a:tailEnd type="none" w="med" len="med"/>
+                    </a:lnT>
+                    <a:lnB w="12700" cap="flat" cmpd="sng" algn="ctr">
+                      <a:noFill/>
+                      <a:prstDash val="solid"/>
+                      <a:round/>
+                      <a:headEnd type="none" w="med" len="med"/>
+                      <a:tailEnd type="none" w="med" len="med"/>
+                    </a:lnB>
+                    <a:lnTlToBr w="12700" cmpd="sng">
+                      <a:noFill/>
+                      <a:prstDash val="solid"/>
+                    </a:lnTlToBr>
+                    <a:lnBlToTr w="12700" cmpd="sng">
+                      <a:noFill/>
+                      <a:prstDash val="solid"/>
+                    </a:lnBlToTr>
+                  </a:tcPr>
                 </a:tc>
               </a:tr>
               <a:tr h="0">
@@ -5041,7 +6045,11 @@
                     <a:p>
                       <a:r>
                         <a:rPr lang="en-US" sz="1100" b="0" dirty="0" smtClean="0"/>
-                        <a:t>            Controlled Structure</a:t>
+                        <a:t>        </a:t>
+                      </a:r>
+                      <a:r>
+                        <a:rPr lang="en-US" sz="1100" b="0" dirty="0" err="1" smtClean="0"/>
+                        <a:t>idref</a:t>
                       </a:r>
                       <a:endParaRPr lang="en-US" sz="1100" b="0" dirty="0"/>
                     </a:p>
@@ -5104,7 +6112,7 @@
                             </a:schemeClr>
                           </a:solidFill>
                         </a:rPr>
-                        <a:t>../../../../descendant-or-self::node()</a:t>
+                        <a:t>example:campaign-1855cb8a-d96c-4859-a450-abb1e7c061f2</a:t>
                       </a:r>
                       <a:endParaRPr lang="en-US" sz="1100" b="0" dirty="0" smtClean="0">
                         <a:solidFill>
@@ -5164,10 +6172,57 @@
                     <a:bodyPr/>
                     <a:lstStyle/>
                     <a:p>
-                      <a:endParaRPr lang="en-US"/>
-                    </a:p>
-                  </a:txBody>
-                  <a:tcPr/>
+                      <a:pPr algn="r"/>
+                      <a:endParaRPr lang="en-US" sz="1100" b="0" dirty="0" smtClean="0">
+                        <a:solidFill>
+                          <a:schemeClr val="tx1">
+                            <a:lumMod val="95000"/>
+                            <a:lumOff val="5000"/>
+                          </a:schemeClr>
+                        </a:solidFill>
+                      </a:endParaRPr>
+                    </a:p>
+                  </a:txBody>
+                  <a:tcPr>
+                    <a:lnL w="12700" cap="flat" cmpd="sng" algn="ctr">
+                      <a:noFill/>
+                      <a:prstDash val="solid"/>
+                      <a:round/>
+                      <a:headEnd type="none" w="med" len="med"/>
+                      <a:tailEnd type="none" w="med" len="med"/>
+                    </a:lnL>
+                    <a:lnR w="12700" cap="flat" cmpd="sng" algn="ctr">
+                      <a:solidFill>
+                        <a:schemeClr val="tx1"/>
+                      </a:solidFill>
+                      <a:prstDash val="solid"/>
+                      <a:round/>
+                      <a:headEnd type="none" w="med" len="med"/>
+                      <a:tailEnd type="none" w="med" len="med"/>
+                    </a:lnR>
+                    <a:lnT w="12700" cap="flat" cmpd="sng" algn="ctr">
+                      <a:noFill/>
+                      <a:prstDash val="solid"/>
+                      <a:round/>
+                      <a:headEnd type="none" w="med" len="med"/>
+                      <a:tailEnd type="none" w="med" len="med"/>
+                    </a:lnT>
+                    <a:lnB w="12700" cap="flat" cmpd="sng" algn="ctr">
+                      <a:noFill/>
+                      <a:prstDash val="solid"/>
+                      <a:round/>
+                      <a:headEnd type="none" w="med" len="med"/>
+                      <a:tailEnd type="none" w="med" len="med"/>
+                    </a:lnB>
+                    <a:lnTlToBr w="12700" cmpd="sng">
+                      <a:noFill/>
+                      <a:prstDash val="solid"/>
+                    </a:lnTlToBr>
+                    <a:lnBlToTr w="12700" cmpd="sng">
+                      <a:noFill/>
+                      <a:prstDash val="solid"/>
+                    </a:lnBlToTr>
+                  </a:tcPr>
                 </a:tc>
               </a:tr>
               <a:tr h="0">
@@ -5176,339 +6231,9 @@
                     <a:bodyPr/>
                     <a:lstStyle/>
                     <a:p>
-                      <a:endParaRPr lang="en-US" sz="1100" b="0" dirty="0"/>
-                    </a:p>
-                  </a:txBody>
-                  <a:tcPr>
-                    <a:lnL w="12700" cap="flat" cmpd="sng" algn="ctr">
-                      <a:solidFill>
-                        <a:schemeClr val="tx1"/>
-                      </a:solidFill>
-                      <a:prstDash val="solid"/>
-                      <a:round/>
-                      <a:headEnd type="none" w="med" len="med"/>
-                      <a:tailEnd type="none" w="med" len="med"/>
-                    </a:lnL>
-                    <a:lnR w="12700" cap="flat" cmpd="sng" algn="ctr">
-                      <a:solidFill>
-                        <a:schemeClr val="tx1"/>
-                      </a:solidFill>
-                      <a:prstDash val="solid"/>
-                      <a:round/>
-                      <a:headEnd type="none" w="med" len="med"/>
-                      <a:tailEnd type="none" w="med" len="med"/>
-                    </a:lnR>
-                  </a:tcPr>
-                </a:tc>
-                <a:tc>
-                  <a:txBody>
-                    <a:bodyPr/>
-                    <a:lstStyle/>
-                    <a:p>
-                      <a:r>
-                        <a:rPr lang="en-US" sz="1100" b="0" dirty="0" smtClean="0"/>
-                        <a:t>            Marking</a:t>
-                      </a:r>
                       <a:r>
                         <a:rPr lang="en-US" sz="1100" b="0" baseline="0" dirty="0" smtClean="0"/>
-                        <a:t> Structure</a:t>
-                      </a:r>
-                      <a:endParaRPr lang="en-US" sz="1100" b="0" dirty="0"/>
-                    </a:p>
-                  </a:txBody>
-                  <a:tcPr>
-                    <a:lnL w="12700" cap="flat" cmpd="sng" algn="ctr">
-                      <a:solidFill>
-                        <a:schemeClr val="tx1"/>
-                      </a:solidFill>
-                      <a:prstDash val="solid"/>
-                      <a:round/>
-                      <a:headEnd type="none" w="med" len="med"/>
-                      <a:tailEnd type="none" w="med" len="med"/>
-                    </a:lnL>
-                    <a:lnR w="12700" cap="flat" cmpd="sng" algn="ctr">
-                      <a:solidFill>
-                        <a:schemeClr val="tx1"/>
-                      </a:solidFill>
-                      <a:prstDash val="solid"/>
-                      <a:round/>
-                      <a:headEnd type="none" w="med" len="med"/>
-                      <a:tailEnd type="none" w="med" len="med"/>
-                    </a:lnR>
-                    <a:lnT w="12700" cap="flat" cmpd="sng" algn="ctr">
-                      <a:noFill/>
-                      <a:prstDash val="solid"/>
-                      <a:round/>
-                      <a:headEnd type="none" w="med" len="med"/>
-                      <a:tailEnd type="none" w="med" len="med"/>
-                    </a:lnT>
-                    <a:lnB w="12700" cap="flat" cmpd="sng" algn="ctr">
-                      <a:noFill/>
-                      <a:prstDash val="solid"/>
-                      <a:round/>
-                      <a:headEnd type="none" w="med" len="med"/>
-                      <a:tailEnd type="none" w="med" len="med"/>
-                    </a:lnB>
-                    <a:lnTlToBr w="12700" cmpd="sng">
-                      <a:noFill/>
-                      <a:prstDash val="solid"/>
-                    </a:lnTlToBr>
-                    <a:lnBlToTr w="12700" cmpd="sng">
-                      <a:noFill/>
-                      <a:prstDash val="solid"/>
-                    </a:lnBlToTr>
-                  </a:tcPr>
-                </a:tc>
-                <a:tc gridSpan="2">
-                  <a:txBody>
-                    <a:bodyPr/>
-                    <a:lstStyle/>
-                    <a:p>
-                      <a:pPr algn="r"/>
-                      <a:r>
-                        <a:rPr lang="en-US" sz="1100" b="0" dirty="0" err="1" smtClean="0">
-                          <a:solidFill>
-                            <a:schemeClr val="bg1">
-                              <a:lumMod val="50000"/>
-                            </a:schemeClr>
-                          </a:solidFill>
-                        </a:rPr>
-                        <a:t>TLPMarkingStructureType</a:t>
-                      </a:r>
-                      <a:endParaRPr lang="en-US" sz="1100" b="0" dirty="0" smtClean="0">
-                        <a:solidFill>
-                          <a:schemeClr val="bg1">
-                            <a:lumMod val="50000"/>
-                          </a:schemeClr>
-                        </a:solidFill>
-                      </a:endParaRPr>
-                    </a:p>
-                  </a:txBody>
-                  <a:tcPr>
-                    <a:lnL w="12700" cap="flat" cmpd="sng" algn="ctr">
-                      <a:solidFill>
-                        <a:schemeClr val="tx1"/>
-                      </a:solidFill>
-                      <a:prstDash val="solid"/>
-                      <a:round/>
-                      <a:headEnd type="none" w="med" len="med"/>
-                      <a:tailEnd type="none" w="med" len="med"/>
-                    </a:lnL>
-                    <a:lnR w="12700" cap="flat" cmpd="sng" algn="ctr">
-                      <a:solidFill>
-                        <a:schemeClr val="tx1"/>
-                      </a:solidFill>
-                      <a:prstDash val="solid"/>
-                      <a:round/>
-                      <a:headEnd type="none" w="med" len="med"/>
-                      <a:tailEnd type="none" w="med" len="med"/>
-                    </a:lnR>
-                    <a:lnT w="12700" cap="flat" cmpd="sng" algn="ctr">
-                      <a:noFill/>
-                      <a:prstDash val="solid"/>
-                      <a:round/>
-                      <a:headEnd type="none" w="med" len="med"/>
-                      <a:tailEnd type="none" w="med" len="med"/>
-                    </a:lnT>
-                    <a:lnB w="12700" cap="flat" cmpd="sng" algn="ctr">
-                      <a:noFill/>
-                      <a:prstDash val="solid"/>
-                      <a:round/>
-                      <a:headEnd type="none" w="med" len="med"/>
-                      <a:tailEnd type="none" w="med" len="med"/>
-                    </a:lnB>
-                    <a:lnTlToBr w="12700" cmpd="sng">
-                      <a:noFill/>
-                      <a:prstDash val="solid"/>
-                    </a:lnTlToBr>
-                    <a:lnBlToTr w="12700" cmpd="sng">
-                      <a:noFill/>
-                      <a:prstDash val="solid"/>
-                    </a:lnBlToTr>
-                  </a:tcPr>
-                </a:tc>
-                <a:tc hMerge="1">
-                  <a:txBody>
-                    <a:bodyPr/>
-                    <a:lstStyle/>
-                    <a:p>
-                      <a:endParaRPr lang="en-US"/>
-                    </a:p>
-                  </a:txBody>
-                  <a:tcPr/>
-                </a:tc>
-              </a:tr>
-              <a:tr h="0">
-                <a:tc>
-                  <a:txBody>
-                    <a:bodyPr/>
-                    <a:lstStyle/>
-                    <a:p>
-                      <a:endParaRPr lang="en-US" sz="1100" b="0" dirty="0"/>
-                    </a:p>
-                  </a:txBody>
-                  <a:tcPr>
-                    <a:lnL w="12700" cap="flat" cmpd="sng" algn="ctr">
-                      <a:solidFill>
-                        <a:schemeClr val="tx1"/>
-                      </a:solidFill>
-                      <a:prstDash val="solid"/>
-                      <a:round/>
-                      <a:headEnd type="none" w="med" len="med"/>
-                      <a:tailEnd type="none" w="med" len="med"/>
-                    </a:lnL>
-                    <a:lnR w="12700" cap="flat" cmpd="sng" algn="ctr">
-                      <a:solidFill>
-                        <a:schemeClr val="tx1"/>
-                      </a:solidFill>
-                      <a:prstDash val="solid"/>
-                      <a:round/>
-                      <a:headEnd type="none" w="med" len="med"/>
-                      <a:tailEnd type="none" w="med" len="med"/>
-                    </a:lnR>
-                  </a:tcPr>
-                </a:tc>
-                <a:tc>
-                  <a:txBody>
-                    <a:bodyPr/>
-                    <a:lstStyle/>
-                    <a:p>
-                      <a:r>
-                        <a:rPr lang="en-US" sz="1100" b="0" dirty="0" smtClean="0"/>
-                        <a:t>            </a:t>
-                      </a:r>
-                      <a:r>
-                        <a:rPr lang="en-US" sz="1100" b="0" baseline="0" dirty="0" smtClean="0"/>
-                        <a:t>    Color</a:t>
-                      </a:r>
-                      <a:endParaRPr lang="en-US" sz="1100" b="0" dirty="0"/>
-                    </a:p>
-                  </a:txBody>
-                  <a:tcPr>
-                    <a:lnL w="12700" cap="flat" cmpd="sng" algn="ctr">
-                      <a:solidFill>
-                        <a:schemeClr val="tx1"/>
-                      </a:solidFill>
-                      <a:prstDash val="solid"/>
-                      <a:round/>
-                      <a:headEnd type="none" w="med" len="med"/>
-                      <a:tailEnd type="none" w="med" len="med"/>
-                    </a:lnL>
-                    <a:lnR w="12700" cap="flat" cmpd="sng" algn="ctr">
-                      <a:solidFill>
-                        <a:schemeClr val="tx1"/>
-                      </a:solidFill>
-                      <a:prstDash val="solid"/>
-                      <a:round/>
-                      <a:headEnd type="none" w="med" len="med"/>
-                      <a:tailEnd type="none" w="med" len="med"/>
-                    </a:lnR>
-                    <a:lnT w="12700" cap="flat" cmpd="sng" algn="ctr">
-                      <a:noFill/>
-                      <a:prstDash val="solid"/>
-                      <a:round/>
-                      <a:headEnd type="none" w="med" len="med"/>
-                      <a:tailEnd type="none" w="med" len="med"/>
-                    </a:lnT>
-                    <a:lnB w="12700" cap="flat" cmpd="sng" algn="ctr">
-                      <a:noFill/>
-                      <a:prstDash val="solid"/>
-                      <a:round/>
-                      <a:headEnd type="none" w="med" len="med"/>
-                      <a:tailEnd type="none" w="med" len="med"/>
-                    </a:lnB>
-                    <a:lnTlToBr w="12700" cmpd="sng">
-                      <a:noFill/>
-                      <a:prstDash val="solid"/>
-                    </a:lnTlToBr>
-                    <a:lnBlToTr w="12700" cmpd="sng">
-                      <a:noFill/>
-                      <a:prstDash val="solid"/>
-                    </a:lnBlToTr>
-                  </a:tcPr>
-                </a:tc>
-                <a:tc gridSpan="2">
-                  <a:txBody>
-                    <a:bodyPr/>
-                    <a:lstStyle/>
-                    <a:p>
-                      <a:pPr algn="l"/>
-                      <a:r>
-                        <a:rPr lang="en-US" sz="1100" b="0" dirty="0" smtClean="0">
-                          <a:solidFill>
-                            <a:schemeClr val="tx1">
-                              <a:lumMod val="95000"/>
-                              <a:lumOff val="5000"/>
-                            </a:schemeClr>
-                          </a:solidFill>
-                        </a:rPr>
-                        <a:t>AMBER</a:t>
-                      </a:r>
-                    </a:p>
-                  </a:txBody>
-                  <a:tcPr>
-                    <a:lnL w="12700" cap="flat" cmpd="sng" algn="ctr">
-                      <a:solidFill>
-                        <a:schemeClr val="tx1"/>
-                      </a:solidFill>
-                      <a:prstDash val="solid"/>
-                      <a:round/>
-                      <a:headEnd type="none" w="med" len="med"/>
-                      <a:tailEnd type="none" w="med" len="med"/>
-                    </a:lnL>
-                    <a:lnR w="12700" cap="flat" cmpd="sng" algn="ctr">
-                      <a:solidFill>
-                        <a:schemeClr val="tx1"/>
-                      </a:solidFill>
-                      <a:prstDash val="solid"/>
-                      <a:round/>
-                      <a:headEnd type="none" w="med" len="med"/>
-                      <a:tailEnd type="none" w="med" len="med"/>
-                    </a:lnR>
-                    <a:lnT w="12700" cap="flat" cmpd="sng" algn="ctr">
-                      <a:noFill/>
-                      <a:prstDash val="solid"/>
-                      <a:round/>
-                      <a:headEnd type="none" w="med" len="med"/>
-                      <a:tailEnd type="none" w="med" len="med"/>
-                    </a:lnT>
-                    <a:lnB w="12700" cap="flat" cmpd="sng" algn="ctr">
-                      <a:noFill/>
-                      <a:prstDash val="solid"/>
-                      <a:round/>
-                      <a:headEnd type="none" w="med" len="med"/>
-                      <a:tailEnd type="none" w="med" len="med"/>
-                    </a:lnB>
-                    <a:lnTlToBr w="12700" cmpd="sng">
-                      <a:noFill/>
-                      <a:prstDash val="solid"/>
-                    </a:lnTlToBr>
-                    <a:lnBlToTr w="12700" cmpd="sng">
-                      <a:noFill/>
-                      <a:prstDash val="solid"/>
-                    </a:lnBlToTr>
-                  </a:tcPr>
-                </a:tc>
-                <a:tc hMerge="1">
-                  <a:txBody>
-                    <a:bodyPr/>
-                    <a:lstStyle/>
-                    <a:p>
-                      <a:endParaRPr lang="en-US"/>
-                    </a:p>
-                  </a:txBody>
-                  <a:tcPr/>
-                </a:tc>
-              </a:tr>
-              <a:tr h="0">
-                <a:tc>
-                  <a:txBody>
-                    <a:bodyPr/>
-                    <a:lstStyle/>
-                    <a:p>
-                      <a:r>
-                        <a:rPr lang="en-US" sz="1100" b="0" baseline="0" dirty="0" smtClean="0"/>
-                        <a:t>    Package</a:t>
+                        <a:t>    Report</a:t>
                       </a:r>
                       <a:endParaRPr lang="en-US" sz="1100" b="0" dirty="0"/>
                     </a:p>
@@ -5562,7 +6287,7 @@
                             <a:schemeClr val="bg1"/>
                           </a:solidFill>
                         </a:rPr>
-                        <a:t>Package</a:t>
+                        <a:t>Report</a:t>
                       </a:r>
                     </a:p>
                   </a:txBody>
@@ -5727,7 +6452,11 @@
                     <a:p>
                       <a:r>
                         <a:rPr lang="en-US" sz="1100" dirty="0" smtClean="0"/>
-                        <a:t>example:package-162faaf6-4fa8-47d8-b128-115b392bbb19</a:t>
+                        <a:t>example:report-</a:t>
+                      </a:r>
+                      <a:r>
+                        <a:rPr lang="en-US" sz="1100" dirty="0" smtClean="0"/>
+                        <a:t>162faaf6-4fa8-47d8-b128-115b392bbb19</a:t>
                       </a:r>
                     </a:p>
                   </a:txBody>
@@ -6167,7 +6896,7 @@
                     </a:lnL>
                     <a:lnR w="12700" cap="flat" cmpd="sng" algn="ctr">
                       <a:solidFill>
-                        <a:schemeClr val="tx1"/>
+                        <a:scrgbClr r="0" g="0" b="0"/>
                       </a:solidFill>
                       <a:prstDash val="solid"/>
                       <a:round/>
@@ -6220,7 +6949,7 @@
                   <a:tcPr>
                     <a:lnL w="12700" cap="flat" cmpd="sng" algn="ctr">
                       <a:solidFill>
-                        <a:schemeClr val="tx1"/>
+                        <a:scrgbClr r="0" g="0" b="0"/>
                       </a:solidFill>
                       <a:prstDash val="solid"/>
                       <a:round/>
@@ -6272,7 +7001,17 @@
                             </a:schemeClr>
                           </a:solidFill>
                         </a:rPr>
-                        <a:t>PackageIntentVocab-1.0</a:t>
+                        <a:t>ReportIntentVocab</a:t>
+                      </a:r>
+                      <a:r>
+                        <a:rPr lang="en-US" sz="1100" b="0" dirty="0" smtClean="0">
+                          <a:solidFill>
+                            <a:schemeClr val="bg1">
+                              <a:lumMod val="50000"/>
+                            </a:schemeClr>
+                          </a:solidFill>
+                        </a:rPr>
+                        <a:t>-1.0</a:t>
                       </a:r>
                       <a:endParaRPr lang="en-US" sz="1100" b="0" dirty="0" smtClean="0">
                         <a:solidFill>
@@ -6341,7 +7080,7 @@
                     <a:p>
                       <a:r>
                         <a:rPr lang="en-US" sz="1100" b="0" dirty="0" smtClean="0"/>
-                        <a:t>    Handling</a:t>
+                        <a:t>TTPs</a:t>
                       </a:r>
                       <a:endParaRPr lang="en-US" sz="1100" b="0" dirty="0"/>
                     </a:p>
@@ -6394,7 +7133,15 @@
                     <a:bodyPr/>
                     <a:lstStyle/>
                     <a:p>
-                      <a:endParaRPr lang="en-US" sz="1100" dirty="0"/>
+                      <a:pPr algn="l"/>
+                      <a:endParaRPr lang="en-US" sz="1100" b="0" dirty="0" smtClean="0">
+                        <a:solidFill>
+                          <a:schemeClr val="tx1">
+                            <a:lumMod val="95000"/>
+                            <a:lumOff val="5000"/>
+                          </a:schemeClr>
+                        </a:solidFill>
+                      </a:endParaRPr>
                     </a:p>
                   </a:txBody>
                   <a:tcPr>
@@ -6445,10 +7192,35 @@
                     <a:bodyPr/>
                     <a:lstStyle/>
                     <a:p>
-                      <a:endParaRPr lang="en-US"/>
-                    </a:p>
-                  </a:txBody>
-                  <a:tcPr/>
+                      <a:pPr algn="r"/>
+                      <a:endParaRPr lang="en-US" sz="1100" b="0" dirty="0" smtClean="0">
+                        <a:solidFill>
+                          <a:schemeClr val="tx1">
+                            <a:lumMod val="95000"/>
+                            <a:lumOff val="5000"/>
+                          </a:schemeClr>
+                        </a:solidFill>
+                      </a:endParaRPr>
+                    </a:p>
+                  </a:txBody>
+                  <a:tcPr>
+                    <a:lnL w="12700" cap="flat" cmpd="sng" algn="ctr">
+                      <a:noFill/>
+                      <a:prstDash val="solid"/>
+                      <a:round/>
+                      <a:headEnd type="none" w="med" len="med"/>
+                      <a:tailEnd type="none" w="med" len="med"/>
+                    </a:lnL>
+                    <a:lnR w="12700" cap="flat" cmpd="sng" algn="ctr">
+                      <a:solidFill>
+                        <a:schemeClr val="tx1"/>
+                      </a:solidFill>
+                      <a:prstDash val="solid"/>
+                      <a:round/>
+                      <a:headEnd type="none" w="med" len="med"/>
+                      <a:tailEnd type="none" w="med" len="med"/>
+                    </a:lnR>
+                  </a:tcPr>
                 </a:tc>
               </a:tr>
               <a:tr h="0">
@@ -6488,7 +7260,7 @@
                     <a:p>
                       <a:r>
                         <a:rPr lang="en-US" sz="1100" b="0" dirty="0" smtClean="0"/>
-                        <a:t>        Marking</a:t>
+                        <a:t>    TTP</a:t>
                       </a:r>
                       <a:endParaRPr lang="en-US" sz="1100" b="0" dirty="0"/>
                     </a:p>
@@ -6541,7 +7313,15 @@
                     <a:bodyPr/>
                     <a:lstStyle/>
                     <a:p>
-                      <a:endParaRPr lang="en-US" sz="1100" dirty="0"/>
+                      <a:pPr algn="l"/>
+                      <a:endParaRPr lang="en-US" sz="1100" b="0" dirty="0" smtClean="0">
+                        <a:solidFill>
+                          <a:schemeClr val="tx1">
+                            <a:lumMod val="95000"/>
+                            <a:lumOff val="5000"/>
+                          </a:schemeClr>
+                        </a:solidFill>
+                      </a:endParaRPr>
                     </a:p>
                   </a:txBody>
                   <a:tcPr>
@@ -6592,10 +7372,35 @@
                     <a:bodyPr/>
                     <a:lstStyle/>
                     <a:p>
-                      <a:endParaRPr lang="en-US"/>
-                    </a:p>
-                  </a:txBody>
-                  <a:tcPr/>
+                      <a:pPr algn="r"/>
+                      <a:endParaRPr lang="en-US" sz="1100" b="0" dirty="0" smtClean="0">
+                        <a:solidFill>
+                          <a:schemeClr val="tx1">
+                            <a:lumMod val="95000"/>
+                            <a:lumOff val="5000"/>
+                          </a:schemeClr>
+                        </a:solidFill>
+                      </a:endParaRPr>
+                    </a:p>
+                  </a:txBody>
+                  <a:tcPr>
+                    <a:lnL w="12700" cap="flat" cmpd="sng" algn="ctr">
+                      <a:noFill/>
+                      <a:prstDash val="solid"/>
+                      <a:round/>
+                      <a:headEnd type="none" w="med" len="med"/>
+                      <a:tailEnd type="none" w="med" len="med"/>
+                    </a:lnL>
+                    <a:lnR w="12700" cap="flat" cmpd="sng" algn="ctr">
+                      <a:solidFill>
+                        <a:schemeClr val="tx1"/>
+                      </a:solidFill>
+                      <a:prstDash val="solid"/>
+                      <a:round/>
+                      <a:headEnd type="none" w="med" len="med"/>
+                      <a:tailEnd type="none" w="med" len="med"/>
+                    </a:lnR>
+                  </a:tcPr>
                 </a:tc>
               </a:tr>
               <a:tr h="0">
@@ -6626,6 +7431,15 @@
                       <a:headEnd type="none" w="med" len="med"/>
                       <a:tailEnd type="none" w="med" len="med"/>
                     </a:lnR>
+                    <a:lnB w="12700" cap="flat" cmpd="sng" algn="ctr">
+                      <a:solidFill>
+                        <a:scrgbClr r="0" g="0" b="0"/>
+                      </a:solidFill>
+                      <a:prstDash val="solid"/>
+                      <a:round/>
+                      <a:headEnd type="none" w="med" len="med"/>
+                      <a:tailEnd type="none" w="med" len="med"/>
+                    </a:lnB>
                   </a:tcPr>
                 </a:tc>
                 <a:tc>
@@ -6635,7 +7449,11 @@
                     <a:p>
                       <a:r>
                         <a:rPr lang="en-US" sz="1100" b="0" dirty="0" smtClean="0"/>
-                        <a:t>            Controlled Structure</a:t>
+                        <a:t>        </a:t>
+                      </a:r>
+                      <a:r>
+                        <a:rPr lang="en-US" sz="1100" b="0" dirty="0" err="1" smtClean="0"/>
+                        <a:t>idref</a:t>
                       </a:r>
                       <a:endParaRPr lang="en-US" sz="1100" b="0" dirty="0"/>
                     </a:p>
@@ -6667,7 +7485,9 @@
                       <a:tailEnd type="none" w="med" len="med"/>
                     </a:lnT>
                     <a:lnB w="12700" cap="flat" cmpd="sng" algn="ctr">
-                      <a:noFill/>
+                      <a:solidFill>
+                        <a:scrgbClr r="0" g="0" b="0"/>
+                      </a:solidFill>
                       <a:prstDash val="solid"/>
                       <a:round/>
                       <a:headEnd type="none" w="med" len="med"/>
@@ -6698,8 +7518,61 @@
                             </a:schemeClr>
                           </a:solidFill>
                         </a:rPr>
-                        <a:t>../../../../descendant-or-self::node()</a:t>
+                        <a:t>example:ttp-66647c79-5766-4ca7-ab8a-a579056e3c83</a:t>
                       </a:r>
+                    </a:p>
+                  </a:txBody>
+                  <a:tcPr>
+                    <a:lnL w="12700" cap="flat" cmpd="sng" algn="ctr">
+                      <a:solidFill>
+                        <a:schemeClr val="tx1"/>
+                      </a:solidFill>
+                      <a:prstDash val="solid"/>
+                      <a:round/>
+                      <a:headEnd type="none" w="med" len="med"/>
+                      <a:tailEnd type="none" w="med" len="med"/>
+                    </a:lnL>
+                    <a:lnR w="12700" cap="flat" cmpd="sng" algn="ctr">
+                      <a:solidFill>
+                        <a:schemeClr val="tx1"/>
+                      </a:solidFill>
+                      <a:prstDash val="solid"/>
+                      <a:round/>
+                      <a:headEnd type="none" w="med" len="med"/>
+                      <a:tailEnd type="none" w="med" len="med"/>
+                    </a:lnR>
+                    <a:lnT w="12700" cap="flat" cmpd="sng" algn="ctr">
+                      <a:noFill/>
+                      <a:prstDash val="solid"/>
+                      <a:round/>
+                      <a:headEnd type="none" w="med" len="med"/>
+                      <a:tailEnd type="none" w="med" len="med"/>
+                    </a:lnT>
+                    <a:lnB w="12700" cap="flat" cmpd="sng" algn="ctr">
+                      <a:solidFill>
+                        <a:scrgbClr r="0" g="0" b="0"/>
+                      </a:solidFill>
+                      <a:prstDash val="solid"/>
+                      <a:round/>
+                      <a:headEnd type="none" w="med" len="med"/>
+                      <a:tailEnd type="none" w="med" len="med"/>
+                    </a:lnB>
+                    <a:lnTlToBr w="12700" cmpd="sng">
+                      <a:noFill/>
+                      <a:prstDash val="solid"/>
+                    </a:lnTlToBr>
+                    <a:lnBlToTr w="12700" cmpd="sng">
+                      <a:noFill/>
+                      <a:prstDash val="solid"/>
+                    </a:lnBlToTr>
+                  </a:tcPr>
+                </a:tc>
+                <a:tc hMerge="1">
+                  <a:txBody>
+                    <a:bodyPr/>
+                    <a:lstStyle/>
+                    <a:p>
+                      <a:pPr algn="r"/>
                       <a:endParaRPr lang="en-US" sz="1100" b="0" dirty="0" smtClean="0">
                         <a:solidFill>
                           <a:schemeClr val="tx1">
@@ -6712,399 +7585,22 @@
                   </a:txBody>
                   <a:tcPr>
                     <a:lnL w="12700" cap="flat" cmpd="sng" algn="ctr">
-                      <a:solidFill>
-                        <a:schemeClr val="tx1"/>
-                      </a:solidFill>
-                      <a:prstDash val="solid"/>
-                      <a:round/>
-                      <a:headEnd type="none" w="med" len="med"/>
-                      <a:tailEnd type="none" w="med" len="med"/>
-                    </a:lnL>
-                    <a:lnR w="12700" cap="flat" cmpd="sng" algn="ctr">
-                      <a:solidFill>
-                        <a:schemeClr val="tx1"/>
-                      </a:solidFill>
-                      <a:prstDash val="solid"/>
-                      <a:round/>
-                      <a:headEnd type="none" w="med" len="med"/>
-                      <a:tailEnd type="none" w="med" len="med"/>
-                    </a:lnR>
-                    <a:lnT w="12700" cap="flat" cmpd="sng" algn="ctr">
-                      <a:noFill/>
-                      <a:prstDash val="solid"/>
-                      <a:round/>
-                      <a:headEnd type="none" w="med" len="med"/>
-                      <a:tailEnd type="none" w="med" len="med"/>
-                    </a:lnT>
-                    <a:lnB w="12700" cap="flat" cmpd="sng" algn="ctr">
-                      <a:noFill/>
-                      <a:prstDash val="solid"/>
-                      <a:round/>
-                      <a:headEnd type="none" w="med" len="med"/>
-                      <a:tailEnd type="none" w="med" len="med"/>
-                    </a:lnB>
-                    <a:lnTlToBr w="12700" cmpd="sng">
-                      <a:noFill/>
-                      <a:prstDash val="solid"/>
-                    </a:lnTlToBr>
-                    <a:lnBlToTr w="12700" cmpd="sng">
-                      <a:noFill/>
-                      <a:prstDash val="solid"/>
-                    </a:lnBlToTr>
-                  </a:tcPr>
-                </a:tc>
-                <a:tc hMerge="1">
-                  <a:txBody>
-                    <a:bodyPr/>
-                    <a:lstStyle/>
-                    <a:p>
-                      <a:endParaRPr lang="en-US"/>
-                    </a:p>
-                  </a:txBody>
-                  <a:tcPr/>
-                </a:tc>
-              </a:tr>
-              <a:tr h="0">
-                <a:tc>
-                  <a:txBody>
-                    <a:bodyPr/>
-                    <a:lstStyle/>
-                    <a:p>
-                      <a:endParaRPr lang="en-US" sz="1100" b="0" dirty="0"/>
-                    </a:p>
-                  </a:txBody>
-                  <a:tcPr>
-                    <a:lnL w="12700" cap="flat" cmpd="sng" algn="ctr">
-                      <a:solidFill>
-                        <a:schemeClr val="tx1"/>
-                      </a:solidFill>
-                      <a:prstDash val="solid"/>
-                      <a:round/>
-                      <a:headEnd type="none" w="med" len="med"/>
-                      <a:tailEnd type="none" w="med" len="med"/>
-                    </a:lnL>
-                    <a:lnR w="12700" cap="flat" cmpd="sng" algn="ctr">
-                      <a:solidFill>
-                        <a:schemeClr val="tx1"/>
-                      </a:solidFill>
-                      <a:prstDash val="solid"/>
-                      <a:round/>
-                      <a:headEnd type="none" w="med" len="med"/>
-                      <a:tailEnd type="none" w="med" len="med"/>
-                    </a:lnR>
-                  </a:tcPr>
-                </a:tc>
-                <a:tc>
-                  <a:txBody>
-                    <a:bodyPr/>
-                    <a:lstStyle/>
-                    <a:p>
-                      <a:r>
-                        <a:rPr lang="en-US" sz="1100" b="0" dirty="0" smtClean="0"/>
-                        <a:t>            Marking</a:t>
-                      </a:r>
-                      <a:r>
-                        <a:rPr lang="en-US" sz="1100" b="0" baseline="0" dirty="0" smtClean="0"/>
-                        <a:t> Structure</a:t>
-                      </a:r>
-                      <a:endParaRPr lang="en-US" sz="1100" b="0" dirty="0"/>
-                    </a:p>
-                  </a:txBody>
-                  <a:tcPr>
-                    <a:lnL w="12700" cap="flat" cmpd="sng" algn="ctr">
-                      <a:solidFill>
-                        <a:schemeClr val="tx1"/>
-                      </a:solidFill>
-                      <a:prstDash val="solid"/>
-                      <a:round/>
-                      <a:headEnd type="none" w="med" len="med"/>
-                      <a:tailEnd type="none" w="med" len="med"/>
-                    </a:lnL>
-                    <a:lnR w="12700" cap="flat" cmpd="sng" algn="ctr">
-                      <a:solidFill>
-                        <a:schemeClr val="tx1"/>
-                      </a:solidFill>
-                      <a:prstDash val="solid"/>
-                      <a:round/>
-                      <a:headEnd type="none" w="med" len="med"/>
-                      <a:tailEnd type="none" w="med" len="med"/>
-                    </a:lnR>
-                    <a:lnT w="12700" cap="flat" cmpd="sng" algn="ctr">
-                      <a:noFill/>
-                      <a:prstDash val="solid"/>
-                      <a:round/>
-                      <a:headEnd type="none" w="med" len="med"/>
-                      <a:tailEnd type="none" w="med" len="med"/>
-                    </a:lnT>
-                    <a:lnB w="12700" cap="flat" cmpd="sng" algn="ctr">
-                      <a:noFill/>
-                      <a:prstDash val="solid"/>
-                      <a:round/>
-                      <a:headEnd type="none" w="med" len="med"/>
-                      <a:tailEnd type="none" w="med" len="med"/>
-                    </a:lnB>
-                    <a:lnTlToBr w="12700" cmpd="sng">
-                      <a:noFill/>
-                      <a:prstDash val="solid"/>
-                    </a:lnTlToBr>
-                    <a:lnBlToTr w="12700" cmpd="sng">
-                      <a:noFill/>
-                      <a:prstDash val="solid"/>
-                    </a:lnBlToTr>
-                  </a:tcPr>
-                </a:tc>
-                <a:tc gridSpan="2">
-                  <a:txBody>
-                    <a:bodyPr/>
-                    <a:lstStyle/>
-                    <a:p>
-                      <a:pPr algn="r"/>
-                      <a:r>
-                        <a:rPr lang="en-US" sz="1100" b="0" dirty="0" err="1" smtClean="0">
-                          <a:solidFill>
-                            <a:schemeClr val="bg1">
-                              <a:lumMod val="50000"/>
-                            </a:schemeClr>
-                          </a:solidFill>
-                        </a:rPr>
-                        <a:t>TLPMarkingStructureType</a:t>
-                      </a:r>
-                      <a:endParaRPr lang="en-US" sz="1100" b="0" dirty="0" smtClean="0">
-                        <a:solidFill>
-                          <a:schemeClr val="bg1">
-                            <a:lumMod val="50000"/>
-                          </a:schemeClr>
-                        </a:solidFill>
-                      </a:endParaRPr>
-                    </a:p>
-                  </a:txBody>
-                  <a:tcPr>
-                    <a:lnL w="12700" cap="flat" cmpd="sng" algn="ctr">
-                      <a:solidFill>
-                        <a:schemeClr val="tx1"/>
-                      </a:solidFill>
-                      <a:prstDash val="solid"/>
-                      <a:round/>
-                      <a:headEnd type="none" w="med" len="med"/>
-                      <a:tailEnd type="none" w="med" len="med"/>
-                    </a:lnL>
-                    <a:lnR w="12700" cap="flat" cmpd="sng" algn="ctr">
-                      <a:solidFill>
-                        <a:schemeClr val="tx1"/>
-                      </a:solidFill>
-                      <a:prstDash val="solid"/>
-                      <a:round/>
-                      <a:headEnd type="none" w="med" len="med"/>
-                      <a:tailEnd type="none" w="med" len="med"/>
-                    </a:lnR>
-                    <a:lnT w="12700" cap="flat" cmpd="sng" algn="ctr">
-                      <a:noFill/>
-                      <a:prstDash val="solid"/>
-                      <a:round/>
-                      <a:headEnd type="none" w="med" len="med"/>
-                      <a:tailEnd type="none" w="med" len="med"/>
-                    </a:lnT>
-                    <a:lnB w="12700" cap="flat" cmpd="sng" algn="ctr">
-                      <a:noFill/>
-                      <a:prstDash val="solid"/>
-                      <a:round/>
-                      <a:headEnd type="none" w="med" len="med"/>
-                      <a:tailEnd type="none" w="med" len="med"/>
-                    </a:lnB>
-                    <a:lnTlToBr w="12700" cmpd="sng">
-                      <a:noFill/>
-                      <a:prstDash val="solid"/>
-                    </a:lnTlToBr>
-                    <a:lnBlToTr w="12700" cmpd="sng">
-                      <a:noFill/>
-                      <a:prstDash val="solid"/>
-                    </a:lnBlToTr>
-                  </a:tcPr>
-                </a:tc>
-                <a:tc hMerge="1">
-                  <a:txBody>
-                    <a:bodyPr/>
-                    <a:lstStyle/>
-                    <a:p>
-                      <a:endParaRPr lang="en-US"/>
-                    </a:p>
-                  </a:txBody>
-                  <a:tcPr/>
-                </a:tc>
-              </a:tr>
-              <a:tr h="0">
-                <a:tc>
-                  <a:txBody>
-                    <a:bodyPr/>
-                    <a:lstStyle/>
-                    <a:p>
-                      <a:endParaRPr lang="en-US" sz="1100" b="0" dirty="0"/>
-                    </a:p>
-                  </a:txBody>
-                  <a:tcPr>
-                    <a:lnL w="12700" cap="flat" cmpd="sng" algn="ctr">
-                      <a:solidFill>
-                        <a:schemeClr val="tx1"/>
-                      </a:solidFill>
-                      <a:prstDash val="solid"/>
-                      <a:round/>
-                      <a:headEnd type="none" w="med" len="med"/>
-                      <a:tailEnd type="none" w="med" len="med"/>
-                    </a:lnL>
-                    <a:lnR w="12700" cap="flat" cmpd="sng" algn="ctr">
-                      <a:solidFill>
-                        <a:schemeClr val="tx1"/>
-                      </a:solidFill>
-                      <a:prstDash val="solid"/>
-                      <a:round/>
-                      <a:headEnd type="none" w="med" len="med"/>
-                      <a:tailEnd type="none" w="med" len="med"/>
-                    </a:lnR>
-                    <a:lnB w="12700" cap="flat" cmpd="sng" algn="ctr">
-                      <a:solidFill>
-                        <a:schemeClr val="tx1"/>
-                      </a:solidFill>
-                      <a:prstDash val="solid"/>
-                      <a:round/>
-                      <a:headEnd type="none" w="med" len="med"/>
-                      <a:tailEnd type="none" w="med" len="med"/>
-                    </a:lnB>
-                  </a:tcPr>
-                </a:tc>
-                <a:tc>
-                  <a:txBody>
-                    <a:bodyPr/>
-                    <a:lstStyle/>
-                    <a:p>
-                      <a:r>
-                        <a:rPr lang="en-US" sz="1100" b="0" dirty="0" smtClean="0"/>
-                        <a:t>            </a:t>
-                      </a:r>
-                      <a:r>
-                        <a:rPr lang="en-US" sz="1100" b="0" baseline="0" dirty="0" smtClean="0"/>
-                        <a:t>    Color</a:t>
-                      </a:r>
-                      <a:endParaRPr lang="en-US" sz="1100" b="0" dirty="0"/>
-                    </a:p>
-                  </a:txBody>
-                  <a:tcPr>
-                    <a:lnL w="12700" cap="flat" cmpd="sng" algn="ctr">
-                      <a:solidFill>
-                        <a:schemeClr val="tx1"/>
-                      </a:solidFill>
-                      <a:prstDash val="solid"/>
-                      <a:round/>
-                      <a:headEnd type="none" w="med" len="med"/>
-                      <a:tailEnd type="none" w="med" len="med"/>
-                    </a:lnL>
-                    <a:lnR w="12700" cap="flat" cmpd="sng" algn="ctr">
-                      <a:solidFill>
-                        <a:schemeClr val="tx1"/>
-                      </a:solidFill>
-                      <a:prstDash val="solid"/>
-                      <a:round/>
-                      <a:headEnd type="none" w="med" len="med"/>
-                      <a:tailEnd type="none" w="med" len="med"/>
-                    </a:lnR>
-                    <a:lnT w="12700" cap="flat" cmpd="sng" algn="ctr">
-                      <a:noFill/>
-                      <a:prstDash val="solid"/>
-                      <a:round/>
-                      <a:headEnd type="none" w="med" len="med"/>
-                      <a:tailEnd type="none" w="med" len="med"/>
-                    </a:lnT>
-                    <a:lnB w="12700" cap="flat" cmpd="sng" algn="ctr">
-                      <a:solidFill>
-                        <a:schemeClr val="tx1"/>
-                      </a:solidFill>
-                      <a:prstDash val="solid"/>
-                      <a:round/>
-                      <a:headEnd type="none" w="med" len="med"/>
-                      <a:tailEnd type="none" w="med" len="med"/>
-                    </a:lnB>
-                    <a:lnTlToBr w="12700" cmpd="sng">
-                      <a:noFill/>
-                      <a:prstDash val="solid"/>
-                    </a:lnTlToBr>
-                    <a:lnBlToTr w="12700" cmpd="sng">
-                      <a:noFill/>
-                      <a:prstDash val="solid"/>
-                    </a:lnBlToTr>
-                  </a:tcPr>
-                </a:tc>
-                <a:tc gridSpan="2">
-                  <a:txBody>
-                    <a:bodyPr/>
-                    <a:lstStyle/>
-                    <a:p>
-                      <a:pPr algn="l"/>
-                      <a:r>
-                        <a:rPr lang="en-US" sz="1100" b="0" dirty="0" smtClean="0">
-                          <a:solidFill>
-                            <a:schemeClr val="tx1">
-                              <a:lumMod val="95000"/>
-                              <a:lumOff val="5000"/>
-                            </a:schemeClr>
-                          </a:solidFill>
-                        </a:rPr>
-                        <a:t>RED</a:t>
-                      </a:r>
-                    </a:p>
-                  </a:txBody>
-                  <a:tcPr>
-                    <a:lnL w="12700" cap="flat" cmpd="sng" algn="ctr">
-                      <a:solidFill>
-                        <a:schemeClr val="tx1"/>
-                      </a:solidFill>
-                      <a:prstDash val="solid"/>
-                      <a:round/>
-                      <a:headEnd type="none" w="med" len="med"/>
-                      <a:tailEnd type="none" w="med" len="med"/>
-                    </a:lnL>
-                    <a:lnR w="12700" cap="flat" cmpd="sng" algn="ctr">
-                      <a:solidFill>
-                        <a:schemeClr val="tx1"/>
-                      </a:solidFill>
-                      <a:prstDash val="solid"/>
-                      <a:round/>
-                      <a:headEnd type="none" w="med" len="med"/>
-                      <a:tailEnd type="none" w="med" len="med"/>
-                    </a:lnR>
-                    <a:lnT w="12700" cap="flat" cmpd="sng" algn="ctr">
-                      <a:noFill/>
-                      <a:prstDash val="solid"/>
-                      <a:round/>
-                      <a:headEnd type="none" w="med" len="med"/>
-                      <a:tailEnd type="none" w="med" len="med"/>
-                    </a:lnT>
-                    <a:lnB w="12700" cap="flat" cmpd="sng" algn="ctr">
-                      <a:solidFill>
-                        <a:schemeClr val="tx1"/>
-                      </a:solidFill>
-                      <a:prstDash val="solid"/>
-                      <a:round/>
-                      <a:headEnd type="none" w="med" len="med"/>
-                      <a:tailEnd type="none" w="med" len="med"/>
-                    </a:lnB>
-                    <a:lnTlToBr w="12700" cmpd="sng">
-                      <a:noFill/>
-                      <a:prstDash val="solid"/>
-                    </a:lnTlToBr>
-                    <a:lnBlToTr w="12700" cmpd="sng">
-                      <a:noFill/>
-                      <a:prstDash val="solid"/>
-                    </a:lnBlToTr>
-                  </a:tcPr>
-                </a:tc>
-                <a:tc hMerge="1">
-                  <a:txBody>
-                    <a:bodyPr/>
-                    <a:lstStyle/>
-                    <a:p>
-                      <a:endParaRPr lang="en-US"/>
-                    </a:p>
-                  </a:txBody>
-                  <a:tcPr/>
+                      <a:noFill/>
+                      <a:prstDash val="solid"/>
+                      <a:round/>
+                      <a:headEnd type="none" w="med" len="med"/>
+                      <a:tailEnd type="none" w="med" len="med"/>
+                    </a:lnL>
+                    <a:lnR w="12700" cap="flat" cmpd="sng" algn="ctr">
+                      <a:solidFill>
+                        <a:schemeClr val="tx1"/>
+                      </a:solidFill>
+                      <a:prstDash val="solid"/>
+                      <a:round/>
+                      <a:headEnd type="none" w="med" len="med"/>
+                      <a:tailEnd type="none" w="med" len="med"/>
+                    </a:lnR>
+                  </a:tcPr>
                 </a:tc>
               </a:tr>
             </a:tbl>

</xml_diff>